<commit_message>
Revision 17 Ago USA
</commit_message>
<xml_diff>
--- a/Documentacion/Flow Chart.pptx
+++ b/Documentacion/Flow Chart.pptx
@@ -114,7 +114,41 @@
       </a:defRPr>
     </a:lvl9pPr>
   </p:defaultTextStyle>
+  <p:extLst>
+    <p:ext uri="{EFAFB233-063F-42B5-8137-9DF3F51BA10A}">
+      <p15:sldGuideLst xmlns:p15="http://schemas.microsoft.com/office/powerpoint/2012/main">
+        <p15:guide id="1" orient="horz" pos="2160">
+          <p15:clr>
+            <a:srgbClr val="A4A3A4"/>
+          </p15:clr>
+        </p15:guide>
+        <p15:guide id="2" pos="2880">
+          <p15:clr>
+            <a:srgbClr val="A4A3A4"/>
+          </p15:clr>
+        </p15:guide>
+      </p15:sldGuideLst>
+    </p:ext>
+    <p:ext uri="{2D200454-40CA-4A62-9FC3-DE9A4176ACB9}">
+      <p15:notesGuideLst xmlns:p15="http://schemas.microsoft.com/office/powerpoint/2012/main">
+        <p15:guide id="1" orient="horz" pos="2957">
+          <p15:clr>
+            <a:srgbClr val="A4A3A4"/>
+          </p15:clr>
+        </p15:guide>
+        <p15:guide id="2" pos="2237">
+          <p15:clr>
+            <a:srgbClr val="A4A3A4"/>
+          </p15:clr>
+        </p15:guide>
+      </p15:notesGuideLst>
+    </p:ext>
+  </p:extLst>
 </p:presentation>
+</file>
+
+<file path=ppt/revisionInfo.xml><?xml version="1.0" encoding="utf-8"?>
+<p1510:revInfo xmlns:a="http://schemas.openxmlformats.org/drawingml/2006/main" xmlns:r="http://schemas.openxmlformats.org/officeDocument/2006/relationships" xmlns:p1510="http://schemas.microsoft.com/office/powerpoint/2015/10/main"/>
 </file>
 
 <file path=ppt/handoutMasters/handoutMaster1.xml><?xml version="1.0" encoding="utf-8"?>
@@ -200,7 +234,7 @@
             <a:fld id="{492C75C8-760F-4DD4-AB18-FA503DCA3769}" type="datetimeFigureOut">
               <a:rPr lang="en-US" smtClean="0"/>
               <a:pPr/>
-              <a:t>12/6/2017</a:t>
+              <a:t>8/17/2017</a:t>
             </a:fld>
             <a:endParaRPr lang="en-US"/>
           </a:p>
@@ -317,10 +351,9 @@
           <a:lstStyle/>
           <a:p>
             <a:r>
-              <a:rPr lang="en-US" smtClean="0"/>
+              <a:rPr lang="en-US"/>
               <a:t>Click to edit Master title style</a:t>
             </a:r>
-            <a:endParaRPr lang="en-US"/>
           </a:p>
         </p:txBody>
       </p:sp>
@@ -436,10 +469,9 @@
           </a:lstStyle>
           <a:p>
             <a:r>
-              <a:rPr lang="en-US" smtClean="0"/>
+              <a:rPr lang="en-US"/>
               <a:t>Click to edit Master subtitle style</a:t>
             </a:r>
-            <a:endParaRPr lang="en-US"/>
           </a:p>
         </p:txBody>
       </p:sp>
@@ -461,7 +493,7 @@
             <a:fld id="{C9BCE4F3-8C28-44D0-BFED-6275A3E28473}" type="datetimeFigureOut">
               <a:rPr lang="en-US" smtClean="0"/>
               <a:pPr/>
-              <a:t>12/6/2017</a:t>
+              <a:t>8/17/2017</a:t>
             </a:fld>
             <a:endParaRPr lang="en-US"/>
           </a:p>
@@ -551,10 +583,9 @@
           <a:lstStyle/>
           <a:p>
             <a:r>
-              <a:rPr lang="en-US" smtClean="0"/>
+              <a:rPr lang="en-US"/>
               <a:t>Click to edit Master title style</a:t>
             </a:r>
-            <a:endParaRPr lang="en-US"/>
           </a:p>
         </p:txBody>
       </p:sp>
@@ -575,38 +606,37 @@
           <a:p>
             <a:pPr lvl="0"/>
             <a:r>
-              <a:rPr lang="en-US" smtClean="0"/>
+              <a:rPr lang="en-US"/>
               <a:t>Click to edit Master text styles</a:t>
             </a:r>
           </a:p>
           <a:p>
             <a:pPr lvl="1"/>
             <a:r>
-              <a:rPr lang="en-US" smtClean="0"/>
+              <a:rPr lang="en-US"/>
               <a:t>Second level</a:t>
             </a:r>
           </a:p>
           <a:p>
             <a:pPr lvl="2"/>
             <a:r>
-              <a:rPr lang="en-US" smtClean="0"/>
+              <a:rPr lang="en-US"/>
               <a:t>Third level</a:t>
             </a:r>
           </a:p>
           <a:p>
             <a:pPr lvl="3"/>
             <a:r>
-              <a:rPr lang="en-US" smtClean="0"/>
+              <a:rPr lang="en-US"/>
               <a:t>Fourth level</a:t>
             </a:r>
           </a:p>
           <a:p>
             <a:pPr lvl="4"/>
             <a:r>
-              <a:rPr lang="en-US" smtClean="0"/>
+              <a:rPr lang="en-US"/>
               <a:t>Fifth level</a:t>
             </a:r>
-            <a:endParaRPr lang="en-US"/>
           </a:p>
         </p:txBody>
       </p:sp>
@@ -628,7 +658,7 @@
             <a:fld id="{C9BCE4F3-8C28-44D0-BFED-6275A3E28473}" type="datetimeFigureOut">
               <a:rPr lang="en-US" smtClean="0"/>
               <a:pPr/>
-              <a:t>12/6/2017</a:t>
+              <a:t>8/17/2017</a:t>
             </a:fld>
             <a:endParaRPr lang="en-US"/>
           </a:p>
@@ -723,10 +753,9 @@
           <a:lstStyle/>
           <a:p>
             <a:r>
-              <a:rPr lang="en-US" smtClean="0"/>
+              <a:rPr lang="en-US"/>
               <a:t>Click to edit Master title style</a:t>
             </a:r>
-            <a:endParaRPr lang="en-US"/>
           </a:p>
         </p:txBody>
       </p:sp>
@@ -752,38 +781,37 @@
           <a:p>
             <a:pPr lvl="0"/>
             <a:r>
-              <a:rPr lang="en-US" smtClean="0"/>
+              <a:rPr lang="en-US"/>
               <a:t>Click to edit Master text styles</a:t>
             </a:r>
           </a:p>
           <a:p>
             <a:pPr lvl="1"/>
             <a:r>
-              <a:rPr lang="en-US" smtClean="0"/>
+              <a:rPr lang="en-US"/>
               <a:t>Second level</a:t>
             </a:r>
           </a:p>
           <a:p>
             <a:pPr lvl="2"/>
             <a:r>
-              <a:rPr lang="en-US" smtClean="0"/>
+              <a:rPr lang="en-US"/>
               <a:t>Third level</a:t>
             </a:r>
           </a:p>
           <a:p>
             <a:pPr lvl="3"/>
             <a:r>
-              <a:rPr lang="en-US" smtClean="0"/>
+              <a:rPr lang="en-US"/>
               <a:t>Fourth level</a:t>
             </a:r>
           </a:p>
           <a:p>
             <a:pPr lvl="4"/>
             <a:r>
-              <a:rPr lang="en-US" smtClean="0"/>
+              <a:rPr lang="en-US"/>
               <a:t>Fifth level</a:t>
             </a:r>
-            <a:endParaRPr lang="en-US"/>
           </a:p>
         </p:txBody>
       </p:sp>
@@ -805,7 +833,7 @@
             <a:fld id="{C9BCE4F3-8C28-44D0-BFED-6275A3E28473}" type="datetimeFigureOut">
               <a:rPr lang="en-US" smtClean="0"/>
               <a:pPr/>
-              <a:t>12/6/2017</a:t>
+              <a:t>8/17/2017</a:t>
             </a:fld>
             <a:endParaRPr lang="en-US"/>
           </a:p>
@@ -895,10 +923,9 @@
           <a:lstStyle/>
           <a:p>
             <a:r>
-              <a:rPr lang="en-US" smtClean="0"/>
+              <a:rPr lang="en-US"/>
               <a:t>Click to edit Master title style</a:t>
             </a:r>
-            <a:endParaRPr lang="en-US"/>
           </a:p>
         </p:txBody>
       </p:sp>
@@ -919,38 +946,37 @@
           <a:p>
             <a:pPr lvl="0"/>
             <a:r>
-              <a:rPr lang="en-US" smtClean="0"/>
+              <a:rPr lang="en-US"/>
               <a:t>Click to edit Master text styles</a:t>
             </a:r>
           </a:p>
           <a:p>
             <a:pPr lvl="1"/>
             <a:r>
-              <a:rPr lang="en-US" smtClean="0"/>
+              <a:rPr lang="en-US"/>
               <a:t>Second level</a:t>
             </a:r>
           </a:p>
           <a:p>
             <a:pPr lvl="2"/>
             <a:r>
-              <a:rPr lang="en-US" smtClean="0"/>
+              <a:rPr lang="en-US"/>
               <a:t>Third level</a:t>
             </a:r>
           </a:p>
           <a:p>
             <a:pPr lvl="3"/>
             <a:r>
-              <a:rPr lang="en-US" smtClean="0"/>
+              <a:rPr lang="en-US"/>
               <a:t>Fourth level</a:t>
             </a:r>
           </a:p>
           <a:p>
             <a:pPr lvl="4"/>
             <a:r>
-              <a:rPr lang="en-US" smtClean="0"/>
+              <a:rPr lang="en-US"/>
               <a:t>Fifth level</a:t>
             </a:r>
-            <a:endParaRPr lang="en-US"/>
           </a:p>
         </p:txBody>
       </p:sp>
@@ -972,7 +998,7 @@
             <a:fld id="{C9BCE4F3-8C28-44D0-BFED-6275A3E28473}" type="datetimeFigureOut">
               <a:rPr lang="en-US" smtClean="0"/>
               <a:pPr/>
-              <a:t>12/6/2017</a:t>
+              <a:t>8/17/2017</a:t>
             </a:fld>
             <a:endParaRPr lang="en-US"/>
           </a:p>
@@ -1071,10 +1097,9 @@
           </a:lstStyle>
           <a:p>
             <a:r>
-              <a:rPr lang="en-US" smtClean="0"/>
+              <a:rPr lang="en-US"/>
               <a:t>Click to edit Master title style</a:t>
             </a:r>
-            <a:endParaRPr lang="en-US"/>
           </a:p>
         </p:txBody>
       </p:sp>
@@ -1191,7 +1216,7 @@
           <a:p>
             <a:pPr lvl="0"/>
             <a:r>
-              <a:rPr lang="en-US" smtClean="0"/>
+              <a:rPr lang="en-US"/>
               <a:t>Click to edit Master text styles</a:t>
             </a:r>
           </a:p>
@@ -1215,7 +1240,7 @@
             <a:fld id="{C9BCE4F3-8C28-44D0-BFED-6275A3E28473}" type="datetimeFigureOut">
               <a:rPr lang="en-US" smtClean="0"/>
               <a:pPr/>
-              <a:t>12/6/2017</a:t>
+              <a:t>8/17/2017</a:t>
             </a:fld>
             <a:endParaRPr lang="en-US"/>
           </a:p>
@@ -1305,10 +1330,9 @@
           <a:lstStyle/>
           <a:p>
             <a:r>
-              <a:rPr lang="en-US" smtClean="0"/>
+              <a:rPr lang="en-US"/>
               <a:t>Click to edit Master title style</a:t>
             </a:r>
-            <a:endParaRPr lang="en-US"/>
           </a:p>
         </p:txBody>
       </p:sp>
@@ -1362,38 +1386,37 @@
           <a:p>
             <a:pPr lvl="0"/>
             <a:r>
-              <a:rPr lang="en-US" smtClean="0"/>
+              <a:rPr lang="en-US"/>
               <a:t>Click to edit Master text styles</a:t>
             </a:r>
           </a:p>
           <a:p>
             <a:pPr lvl="1"/>
             <a:r>
-              <a:rPr lang="en-US" smtClean="0"/>
+              <a:rPr lang="en-US"/>
               <a:t>Second level</a:t>
             </a:r>
           </a:p>
           <a:p>
             <a:pPr lvl="2"/>
             <a:r>
-              <a:rPr lang="en-US" smtClean="0"/>
+              <a:rPr lang="en-US"/>
               <a:t>Third level</a:t>
             </a:r>
           </a:p>
           <a:p>
             <a:pPr lvl="3"/>
             <a:r>
-              <a:rPr lang="en-US" smtClean="0"/>
+              <a:rPr lang="en-US"/>
               <a:t>Fourth level</a:t>
             </a:r>
           </a:p>
           <a:p>
             <a:pPr lvl="4"/>
             <a:r>
-              <a:rPr lang="en-US" smtClean="0"/>
+              <a:rPr lang="en-US"/>
               <a:t>Fifth level</a:t>
             </a:r>
-            <a:endParaRPr lang="en-US"/>
           </a:p>
         </p:txBody>
       </p:sp>
@@ -1447,38 +1470,37 @@
           <a:p>
             <a:pPr lvl="0"/>
             <a:r>
-              <a:rPr lang="en-US" smtClean="0"/>
+              <a:rPr lang="en-US"/>
               <a:t>Click to edit Master text styles</a:t>
             </a:r>
           </a:p>
           <a:p>
             <a:pPr lvl="1"/>
             <a:r>
-              <a:rPr lang="en-US" smtClean="0"/>
+              <a:rPr lang="en-US"/>
               <a:t>Second level</a:t>
             </a:r>
           </a:p>
           <a:p>
             <a:pPr lvl="2"/>
             <a:r>
-              <a:rPr lang="en-US" smtClean="0"/>
+              <a:rPr lang="en-US"/>
               <a:t>Third level</a:t>
             </a:r>
           </a:p>
           <a:p>
             <a:pPr lvl="3"/>
             <a:r>
-              <a:rPr lang="en-US" smtClean="0"/>
+              <a:rPr lang="en-US"/>
               <a:t>Fourth level</a:t>
             </a:r>
           </a:p>
           <a:p>
             <a:pPr lvl="4"/>
             <a:r>
-              <a:rPr lang="en-US" smtClean="0"/>
+              <a:rPr lang="en-US"/>
               <a:t>Fifth level</a:t>
             </a:r>
-            <a:endParaRPr lang="en-US"/>
           </a:p>
         </p:txBody>
       </p:sp>
@@ -1500,7 +1522,7 @@
             <a:fld id="{C9BCE4F3-8C28-44D0-BFED-6275A3E28473}" type="datetimeFigureOut">
               <a:rPr lang="en-US" smtClean="0"/>
               <a:pPr/>
-              <a:t>12/6/2017</a:t>
+              <a:t>8/17/2017</a:t>
             </a:fld>
             <a:endParaRPr lang="en-US"/>
           </a:p>
@@ -1594,10 +1616,9 @@
           </a:lstStyle>
           <a:p>
             <a:r>
-              <a:rPr lang="en-US" smtClean="0"/>
+              <a:rPr lang="en-US"/>
               <a:t>Click to edit Master title style</a:t>
             </a:r>
-            <a:endParaRPr lang="en-US"/>
           </a:p>
         </p:txBody>
       </p:sp>
@@ -1660,7 +1681,7 @@
           <a:p>
             <a:pPr lvl="0"/>
             <a:r>
-              <a:rPr lang="en-US" smtClean="0"/>
+              <a:rPr lang="en-US"/>
               <a:t>Click to edit Master text styles</a:t>
             </a:r>
           </a:p>
@@ -1716,38 +1737,37 @@
           <a:p>
             <a:pPr lvl="0"/>
             <a:r>
-              <a:rPr lang="en-US" smtClean="0"/>
+              <a:rPr lang="en-US"/>
               <a:t>Click to edit Master text styles</a:t>
             </a:r>
           </a:p>
           <a:p>
             <a:pPr lvl="1"/>
             <a:r>
-              <a:rPr lang="en-US" smtClean="0"/>
+              <a:rPr lang="en-US"/>
               <a:t>Second level</a:t>
             </a:r>
           </a:p>
           <a:p>
             <a:pPr lvl="2"/>
             <a:r>
-              <a:rPr lang="en-US" smtClean="0"/>
+              <a:rPr lang="en-US"/>
               <a:t>Third level</a:t>
             </a:r>
           </a:p>
           <a:p>
             <a:pPr lvl="3"/>
             <a:r>
-              <a:rPr lang="en-US" smtClean="0"/>
+              <a:rPr lang="en-US"/>
               <a:t>Fourth level</a:t>
             </a:r>
           </a:p>
           <a:p>
             <a:pPr lvl="4"/>
             <a:r>
-              <a:rPr lang="en-US" smtClean="0"/>
+              <a:rPr lang="en-US"/>
               <a:t>Fifth level</a:t>
             </a:r>
-            <a:endParaRPr lang="en-US"/>
           </a:p>
         </p:txBody>
       </p:sp>
@@ -1810,7 +1830,7 @@
           <a:p>
             <a:pPr lvl="0"/>
             <a:r>
-              <a:rPr lang="en-US" smtClean="0"/>
+              <a:rPr lang="en-US"/>
               <a:t>Click to edit Master text styles</a:t>
             </a:r>
           </a:p>
@@ -1866,38 +1886,37 @@
           <a:p>
             <a:pPr lvl="0"/>
             <a:r>
-              <a:rPr lang="en-US" smtClean="0"/>
+              <a:rPr lang="en-US"/>
               <a:t>Click to edit Master text styles</a:t>
             </a:r>
           </a:p>
           <a:p>
             <a:pPr lvl="1"/>
             <a:r>
-              <a:rPr lang="en-US" smtClean="0"/>
+              <a:rPr lang="en-US"/>
               <a:t>Second level</a:t>
             </a:r>
           </a:p>
           <a:p>
             <a:pPr lvl="2"/>
             <a:r>
-              <a:rPr lang="en-US" smtClean="0"/>
+              <a:rPr lang="en-US"/>
               <a:t>Third level</a:t>
             </a:r>
           </a:p>
           <a:p>
             <a:pPr lvl="3"/>
             <a:r>
-              <a:rPr lang="en-US" smtClean="0"/>
+              <a:rPr lang="en-US"/>
               <a:t>Fourth level</a:t>
             </a:r>
           </a:p>
           <a:p>
             <a:pPr lvl="4"/>
             <a:r>
-              <a:rPr lang="en-US" smtClean="0"/>
+              <a:rPr lang="en-US"/>
               <a:t>Fifth level</a:t>
             </a:r>
-            <a:endParaRPr lang="en-US"/>
           </a:p>
         </p:txBody>
       </p:sp>
@@ -1919,7 +1938,7 @@
             <a:fld id="{C9BCE4F3-8C28-44D0-BFED-6275A3E28473}" type="datetimeFigureOut">
               <a:rPr lang="en-US" smtClean="0"/>
               <a:pPr/>
-              <a:t>12/6/2017</a:t>
+              <a:t>8/17/2017</a:t>
             </a:fld>
             <a:endParaRPr lang="en-US"/>
           </a:p>
@@ -2009,10 +2028,9 @@
           <a:lstStyle/>
           <a:p>
             <a:r>
-              <a:rPr lang="en-US" smtClean="0"/>
+              <a:rPr lang="en-US"/>
               <a:t>Click to edit Master title style</a:t>
             </a:r>
-            <a:endParaRPr lang="en-US"/>
           </a:p>
         </p:txBody>
       </p:sp>
@@ -2034,7 +2052,7 @@
             <a:fld id="{C9BCE4F3-8C28-44D0-BFED-6275A3E28473}" type="datetimeFigureOut">
               <a:rPr lang="en-US" smtClean="0"/>
               <a:pPr/>
-              <a:t>12/6/2017</a:t>
+              <a:t>8/17/2017</a:t>
             </a:fld>
             <a:endParaRPr lang="en-US"/>
           </a:p>
@@ -2126,7 +2144,7 @@
             <a:fld id="{C9BCE4F3-8C28-44D0-BFED-6275A3E28473}" type="datetimeFigureOut">
               <a:rPr lang="en-US" smtClean="0"/>
               <a:pPr/>
-              <a:t>12/6/2017</a:t>
+              <a:t>8/17/2017</a:t>
             </a:fld>
             <a:endParaRPr lang="en-US"/>
           </a:p>
@@ -2225,10 +2243,9 @@
           </a:lstStyle>
           <a:p>
             <a:r>
-              <a:rPr lang="en-US" smtClean="0"/>
+              <a:rPr lang="en-US"/>
               <a:t>Click to edit Master title style</a:t>
             </a:r>
-            <a:endParaRPr lang="en-US"/>
           </a:p>
         </p:txBody>
       </p:sp>
@@ -2282,38 +2299,37 @@
           <a:p>
             <a:pPr lvl="0"/>
             <a:r>
-              <a:rPr lang="en-US" smtClean="0"/>
+              <a:rPr lang="en-US"/>
               <a:t>Click to edit Master text styles</a:t>
             </a:r>
           </a:p>
           <a:p>
             <a:pPr lvl="1"/>
             <a:r>
-              <a:rPr lang="en-US" smtClean="0"/>
+              <a:rPr lang="en-US"/>
               <a:t>Second level</a:t>
             </a:r>
           </a:p>
           <a:p>
             <a:pPr lvl="2"/>
             <a:r>
-              <a:rPr lang="en-US" smtClean="0"/>
+              <a:rPr lang="en-US"/>
               <a:t>Third level</a:t>
             </a:r>
           </a:p>
           <a:p>
             <a:pPr lvl="3"/>
             <a:r>
-              <a:rPr lang="en-US" smtClean="0"/>
+              <a:rPr lang="en-US"/>
               <a:t>Fourth level</a:t>
             </a:r>
           </a:p>
           <a:p>
             <a:pPr lvl="4"/>
             <a:r>
-              <a:rPr lang="en-US" smtClean="0"/>
+              <a:rPr lang="en-US"/>
               <a:t>Fifth level</a:t>
             </a:r>
-            <a:endParaRPr lang="en-US"/>
           </a:p>
         </p:txBody>
       </p:sp>
@@ -2376,7 +2392,7 @@
           <a:p>
             <a:pPr lvl="0"/>
             <a:r>
-              <a:rPr lang="en-US" smtClean="0"/>
+              <a:rPr lang="en-US"/>
               <a:t>Click to edit Master text styles</a:t>
             </a:r>
           </a:p>
@@ -2400,7 +2416,7 @@
             <a:fld id="{C9BCE4F3-8C28-44D0-BFED-6275A3E28473}" type="datetimeFigureOut">
               <a:rPr lang="en-US" smtClean="0"/>
               <a:pPr/>
-              <a:t>12/6/2017</a:t>
+              <a:t>8/17/2017</a:t>
             </a:fld>
             <a:endParaRPr lang="en-US"/>
           </a:p>
@@ -2499,10 +2515,9 @@
           </a:lstStyle>
           <a:p>
             <a:r>
-              <a:rPr lang="en-US" smtClean="0"/>
+              <a:rPr lang="en-US"/>
               <a:t>Click to edit Master title style</a:t>
             </a:r>
-            <a:endParaRPr lang="en-US"/>
           </a:p>
         </p:txBody>
       </p:sp>
@@ -2626,7 +2641,7 @@
           <a:p>
             <a:pPr lvl="0"/>
             <a:r>
-              <a:rPr lang="en-US" smtClean="0"/>
+              <a:rPr lang="en-US"/>
               <a:t>Click to edit Master text styles</a:t>
             </a:r>
           </a:p>
@@ -2650,7 +2665,7 @@
             <a:fld id="{C9BCE4F3-8C28-44D0-BFED-6275A3E28473}" type="datetimeFigureOut">
               <a:rPr lang="en-US" smtClean="0"/>
               <a:pPr/>
-              <a:t>12/6/2017</a:t>
+              <a:t>8/17/2017</a:t>
             </a:fld>
             <a:endParaRPr lang="en-US"/>
           </a:p>
@@ -2755,10 +2770,9 @@
           <a:lstStyle/>
           <a:p>
             <a:r>
-              <a:rPr lang="en-US" smtClean="0"/>
+              <a:rPr lang="en-US"/>
               <a:t>Click to edit Master title style</a:t>
             </a:r>
-            <a:endParaRPr lang="en-US"/>
           </a:p>
         </p:txBody>
       </p:sp>
@@ -2789,38 +2803,37 @@
           <a:p>
             <a:pPr lvl="0"/>
             <a:r>
-              <a:rPr lang="en-US" smtClean="0"/>
+              <a:rPr lang="en-US"/>
               <a:t>Click to edit Master text styles</a:t>
             </a:r>
           </a:p>
           <a:p>
             <a:pPr lvl="1"/>
             <a:r>
-              <a:rPr lang="en-US" smtClean="0"/>
+              <a:rPr lang="en-US"/>
               <a:t>Second level</a:t>
             </a:r>
           </a:p>
           <a:p>
             <a:pPr lvl="2"/>
             <a:r>
-              <a:rPr lang="en-US" smtClean="0"/>
+              <a:rPr lang="en-US"/>
               <a:t>Third level</a:t>
             </a:r>
           </a:p>
           <a:p>
             <a:pPr lvl="3"/>
             <a:r>
-              <a:rPr lang="en-US" smtClean="0"/>
+              <a:rPr lang="en-US"/>
               <a:t>Fourth level</a:t>
             </a:r>
           </a:p>
           <a:p>
             <a:pPr lvl="4"/>
             <a:r>
-              <a:rPr lang="en-US" smtClean="0"/>
+              <a:rPr lang="en-US"/>
               <a:t>Fifth level</a:t>
             </a:r>
-            <a:endParaRPr lang="en-US"/>
           </a:p>
         </p:txBody>
       </p:sp>
@@ -2860,7 +2873,7 @@
             <a:fld id="{C9BCE4F3-8C28-44D0-BFED-6275A3E28473}" type="datetimeFigureOut">
               <a:rPr lang="en-US" smtClean="0"/>
               <a:pPr/>
-              <a:t>12/6/2017</a:t>
+              <a:t>8/17/2017</a:t>
             </a:fld>
             <a:endParaRPr lang="en-US"/>
           </a:p>
@@ -3274,7 +3287,7 @@
           <a:p>
             <a:pPr algn="ctr"/>
             <a:r>
-              <a:rPr lang="en-US" sz="800" dirty="0" smtClean="0">
+              <a:rPr lang="en-US" sz="800" dirty="0">
                 <a:solidFill>
                   <a:schemeClr val="tx1"/>
                 </a:solidFill>
@@ -3327,7 +3340,7 @@
           <a:p>
             <a:pPr algn="ctr"/>
             <a:r>
-              <a:rPr lang="en-US" sz="800" dirty="0" smtClean="0">
+              <a:rPr lang="en-US" sz="800" dirty="0">
                 <a:solidFill>
                   <a:schemeClr val="tx1"/>
                 </a:solidFill>
@@ -3380,7 +3393,7 @@
           <a:p>
             <a:pPr algn="ctr"/>
             <a:r>
-              <a:rPr lang="en-US" sz="800" dirty="0" smtClean="0">
+              <a:rPr lang="en-US" sz="800" dirty="0">
                 <a:solidFill>
                   <a:schemeClr val="tx1"/>
                 </a:solidFill>
@@ -3388,14 +3401,14 @@
               <a:t>New</a:t>
             </a:r>
             <a:br>
-              <a:rPr lang="en-US" sz="800" dirty="0" smtClean="0">
+              <a:rPr lang="en-US" sz="800" dirty="0">
                 <a:solidFill>
                   <a:schemeClr val="tx1"/>
                 </a:solidFill>
               </a:rPr>
             </a:br>
             <a:r>
-              <a:rPr lang="en-US" sz="800" dirty="0" smtClean="0">
+              <a:rPr lang="en-US" sz="800" dirty="0">
                 <a:solidFill>
                   <a:schemeClr val="tx1"/>
                 </a:solidFill>
@@ -3428,10 +3441,9 @@
           <a:lstStyle/>
           <a:p>
             <a:r>
-              <a:rPr lang="en-US" sz="800" dirty="0" smtClean="0"/>
+              <a:rPr lang="en-US" sz="800" dirty="0"/>
               <a:t>ID=1.0.0.0</a:t>
             </a:r>
-            <a:endParaRPr lang="en-US" sz="800" dirty="0"/>
           </a:p>
         </p:txBody>
       </p:sp>
@@ -3478,7 +3490,7 @@
           <a:p>
             <a:pPr algn="ctr"/>
             <a:r>
-              <a:rPr lang="en-US" sz="800" dirty="0" smtClean="0">
+              <a:rPr lang="en-US" sz="800" dirty="0">
                 <a:solidFill>
                   <a:schemeClr val="tx1"/>
                 </a:solidFill>
@@ -3511,10 +3523,9 @@
           <a:lstStyle/>
           <a:p>
             <a:r>
-              <a:rPr lang="en-US" sz="800" dirty="0" smtClean="0"/>
+              <a:rPr lang="en-US" sz="800" dirty="0"/>
               <a:t>ID=1.1.0.0</a:t>
             </a:r>
-            <a:endParaRPr lang="en-US" sz="800" dirty="0"/>
           </a:p>
         </p:txBody>
       </p:sp>
@@ -3561,7 +3572,7 @@
           <a:p>
             <a:pPr algn="ctr"/>
             <a:r>
-              <a:rPr lang="en-US" sz="800" dirty="0" smtClean="0">
+              <a:rPr lang="en-US" sz="800" dirty="0">
                 <a:solidFill>
                   <a:schemeClr val="tx1"/>
                 </a:solidFill>
@@ -3594,10 +3605,9 @@
           <a:lstStyle/>
           <a:p>
             <a:r>
-              <a:rPr lang="en-US" sz="800" dirty="0" smtClean="0"/>
+              <a:rPr lang="en-US" sz="800" dirty="0"/>
               <a:t>ID=1.2.0.0</a:t>
             </a:r>
-            <a:endParaRPr lang="en-US" sz="800" dirty="0"/>
           </a:p>
         </p:txBody>
       </p:sp>
@@ -3644,7 +3654,7 @@
           <a:p>
             <a:pPr algn="ctr"/>
             <a:r>
-              <a:rPr lang="en-US" sz="800" dirty="0" smtClean="0">
+              <a:rPr lang="en-US" sz="800" dirty="0">
                 <a:solidFill>
                   <a:schemeClr val="tx1"/>
                 </a:solidFill>
@@ -3677,10 +3687,9 @@
           <a:lstStyle/>
           <a:p>
             <a:r>
-              <a:rPr lang="en-US" sz="800" dirty="0" smtClean="0"/>
+              <a:rPr lang="en-US" sz="800" dirty="0"/>
               <a:t>ID=1.3.0.0</a:t>
             </a:r>
-            <a:endParaRPr lang="en-US" sz="800" dirty="0"/>
           </a:p>
         </p:txBody>
       </p:sp>
@@ -3707,7 +3716,7 @@
           <a:lstStyle/>
           <a:p>
             <a:r>
-              <a:rPr lang="en-US" sz="1000" dirty="0" smtClean="0">
+              <a:rPr lang="en-US" sz="1000" dirty="0">
                 <a:solidFill>
                   <a:schemeClr val="bg1">
                     <a:lumMod val="65000"/>
@@ -3716,13 +3725,6 @@
               </a:rPr>
               <a:t>INDUSTRY</a:t>
             </a:r>
-            <a:endParaRPr lang="en-US" sz="1000" dirty="0">
-              <a:solidFill>
-                <a:schemeClr val="bg1">
-                  <a:lumMod val="65000"/>
-                </a:schemeClr>
-              </a:solidFill>
-            </a:endParaRPr>
           </a:p>
         </p:txBody>
       </p:sp>
@@ -3783,7 +3785,7 @@
             <a:p>
               <a:pPr algn="ctr"/>
               <a:r>
-                <a:rPr lang="en-US" sz="800" dirty="0" smtClean="0">
+                <a:rPr lang="en-US" sz="800" dirty="0">
                   <a:solidFill>
                     <a:schemeClr val="tx1"/>
                   </a:solidFill>
@@ -3836,7 +3838,7 @@
             <a:p>
               <a:pPr algn="ctr"/>
               <a:r>
-                <a:rPr lang="en-US" sz="800" dirty="0" smtClean="0">
+                <a:rPr lang="en-US" sz="800" dirty="0">
                   <a:solidFill>
                     <a:schemeClr val="tx1"/>
                   </a:solidFill>
@@ -3889,7 +3891,7 @@
             <a:p>
               <a:pPr algn="ctr"/>
               <a:r>
-                <a:rPr lang="en-US" sz="800" dirty="0" smtClean="0">
+                <a:rPr lang="en-US" sz="800" dirty="0">
                   <a:solidFill>
                     <a:schemeClr val="tx1"/>
                   </a:solidFill>
@@ -3922,10 +3924,9 @@
             <a:lstStyle/>
             <a:p>
               <a:r>
-                <a:rPr lang="en-US" sz="800" dirty="0" smtClean="0"/>
+                <a:rPr lang="en-US" sz="800" dirty="0"/>
                 <a:t>ID=1.1.1.0</a:t>
               </a:r>
-              <a:endParaRPr lang="en-US" sz="800" dirty="0"/>
             </a:p>
           </p:txBody>
         </p:sp>
@@ -3952,10 +3953,9 @@
             <a:lstStyle/>
             <a:p>
               <a:r>
-                <a:rPr lang="en-US" sz="800" dirty="0" smtClean="0"/>
+                <a:rPr lang="en-US" sz="800" dirty="0"/>
                 <a:t>ID=1.1.2.0</a:t>
               </a:r>
-              <a:endParaRPr lang="en-US" sz="800" dirty="0"/>
             </a:p>
           </p:txBody>
         </p:sp>
@@ -3982,10 +3982,9 @@
             <a:lstStyle/>
             <a:p>
               <a:r>
-                <a:rPr lang="en-US" sz="800" dirty="0" smtClean="0"/>
+                <a:rPr lang="en-US" sz="800" dirty="0"/>
                 <a:t>ID=1.1.3.0</a:t>
               </a:r>
-              <a:endParaRPr lang="en-US" sz="800" dirty="0"/>
             </a:p>
           </p:txBody>
         </p:sp>
@@ -4047,14 +4046,14 @@
             <a:p>
               <a:pPr algn="ctr"/>
               <a:r>
-                <a:rPr lang="en-US" sz="800" dirty="0" err="1" smtClean="0">
+                <a:rPr lang="en-US" sz="800" dirty="0" err="1">
                   <a:solidFill>
                     <a:schemeClr val="tx1"/>
                   </a:solidFill>
                 </a:rPr>
                 <a:t>Contacs</a:t>
               </a:r>
-              <a:endParaRPr lang="en-US" sz="800" dirty="0" smtClean="0">
+              <a:endParaRPr lang="en-US" sz="800" dirty="0">
                 <a:solidFill>
                   <a:schemeClr val="tx1"/>
                 </a:solidFill>
@@ -4085,10 +4084,9 @@
             <a:lstStyle/>
             <a:p>
               <a:r>
-                <a:rPr lang="en-US" sz="800" dirty="0" smtClean="0"/>
+                <a:rPr lang="en-US" sz="800" dirty="0"/>
                 <a:t>ID=1.1.1.1</a:t>
               </a:r>
-              <a:endParaRPr lang="en-US" sz="800" dirty="0"/>
             </a:p>
           </p:txBody>
         </p:sp>
@@ -4135,7 +4133,7 @@
             <a:p>
               <a:pPr algn="ctr"/>
               <a:r>
-                <a:rPr lang="en-US" sz="800" dirty="0" smtClean="0">
+                <a:rPr lang="en-US" sz="800" dirty="0">
                   <a:solidFill>
                     <a:schemeClr val="tx1"/>
                   </a:solidFill>
@@ -4143,14 +4141,14 @@
                 <a:t>Wind</a:t>
               </a:r>
               <a:br>
-                <a:rPr lang="en-US" sz="800" dirty="0" smtClean="0">
+                <a:rPr lang="en-US" sz="800" dirty="0">
                   <a:solidFill>
                     <a:schemeClr val="tx1"/>
                   </a:solidFill>
                 </a:rPr>
               </a:br>
               <a:r>
-                <a:rPr lang="en-US" sz="800" dirty="0" smtClean="0">
+                <a:rPr lang="en-US" sz="800" dirty="0">
                   <a:solidFill>
                     <a:schemeClr val="tx1"/>
                   </a:solidFill>
@@ -4183,10 +4181,9 @@
             <a:lstStyle/>
             <a:p>
               <a:r>
-                <a:rPr lang="en-US" sz="800" dirty="0" smtClean="0"/>
+                <a:rPr lang="en-US" sz="800" dirty="0"/>
                 <a:t>ID=1.1.1.2</a:t>
               </a:r>
-              <a:endParaRPr lang="en-US" sz="800" dirty="0"/>
             </a:p>
           </p:txBody>
         </p:sp>
@@ -4248,7 +4245,7 @@
             <a:p>
               <a:pPr algn="ctr"/>
               <a:r>
-                <a:rPr lang="en-US" sz="800" dirty="0" smtClean="0">
+                <a:rPr lang="en-US" sz="800" dirty="0">
                   <a:solidFill>
                     <a:schemeClr val="tx1"/>
                   </a:solidFill>
@@ -4301,7 +4298,7 @@
             <a:p>
               <a:pPr algn="ctr"/>
               <a:r>
-                <a:rPr lang="en-US" sz="800" dirty="0" smtClean="0">
+                <a:rPr lang="en-US" sz="800" dirty="0">
                   <a:solidFill>
                     <a:schemeClr val="tx1"/>
                   </a:solidFill>
@@ -4354,7 +4351,7 @@
             <a:p>
               <a:pPr algn="ctr"/>
               <a:r>
-                <a:rPr lang="en-US" sz="800" dirty="0" smtClean="0">
+                <a:rPr lang="en-US" sz="800" dirty="0">
                   <a:solidFill>
                     <a:schemeClr val="tx1"/>
                   </a:solidFill>
@@ -4387,10 +4384,9 @@
             <a:lstStyle/>
             <a:p>
               <a:r>
-                <a:rPr lang="en-US" sz="800" dirty="0" smtClean="0"/>
+                <a:rPr lang="en-US" sz="800" dirty="0"/>
                 <a:t>ID=1.2.1.0</a:t>
               </a:r>
-              <a:endParaRPr lang="en-US" sz="800" dirty="0"/>
             </a:p>
           </p:txBody>
         </p:sp>
@@ -4417,10 +4413,9 @@
             <a:lstStyle/>
             <a:p>
               <a:r>
-                <a:rPr lang="en-US" sz="800" dirty="0" smtClean="0"/>
+                <a:rPr lang="en-US" sz="800" dirty="0"/>
                 <a:t>ID=1.2.2.0</a:t>
               </a:r>
-              <a:endParaRPr lang="en-US" sz="800" dirty="0"/>
             </a:p>
           </p:txBody>
         </p:sp>
@@ -4447,10 +4442,9 @@
             <a:lstStyle/>
             <a:p>
               <a:r>
-                <a:rPr lang="en-US" sz="800" dirty="0" smtClean="0"/>
+                <a:rPr lang="en-US" sz="800" dirty="0"/>
                 <a:t>ID=1.2.3.0</a:t>
               </a:r>
-              <a:endParaRPr lang="en-US" sz="800" dirty="0"/>
             </a:p>
           </p:txBody>
         </p:sp>
@@ -4512,7 +4506,7 @@
             <a:p>
               <a:pPr algn="ctr"/>
               <a:r>
-                <a:rPr lang="en-US" sz="800" dirty="0" smtClean="0">
+                <a:rPr lang="en-US" sz="800" dirty="0">
                   <a:solidFill>
                     <a:schemeClr val="tx1"/>
                   </a:solidFill>
@@ -4565,7 +4559,7 @@
             <a:p>
               <a:pPr algn="ctr"/>
               <a:r>
-                <a:rPr lang="en-US" sz="800" dirty="0" smtClean="0">
+                <a:rPr lang="en-US" sz="800" dirty="0">
                   <a:solidFill>
                     <a:schemeClr val="tx1"/>
                   </a:solidFill>
@@ -4618,7 +4612,7 @@
             <a:p>
               <a:pPr algn="ctr"/>
               <a:r>
-                <a:rPr lang="en-US" sz="800" dirty="0" smtClean="0">
+                <a:rPr lang="en-US" sz="800" dirty="0">
                   <a:solidFill>
                     <a:schemeClr val="tx1"/>
                   </a:solidFill>
@@ -4651,10 +4645,9 @@
             <a:lstStyle/>
             <a:p>
               <a:r>
-                <a:rPr lang="en-US" sz="800" dirty="0" smtClean="0"/>
+                <a:rPr lang="en-US" sz="800" dirty="0"/>
                 <a:t>ID=1.3.1.0</a:t>
               </a:r>
-              <a:endParaRPr lang="en-US" sz="800" dirty="0"/>
             </a:p>
           </p:txBody>
         </p:sp>
@@ -4681,10 +4674,9 @@
             <a:lstStyle/>
             <a:p>
               <a:r>
-                <a:rPr lang="en-US" sz="800" dirty="0" smtClean="0"/>
+                <a:rPr lang="en-US" sz="800" dirty="0"/>
                 <a:t>ID=1.3.2.0</a:t>
               </a:r>
-              <a:endParaRPr lang="en-US" sz="800" dirty="0"/>
             </a:p>
           </p:txBody>
         </p:sp>
@@ -4711,10 +4703,9 @@
             <a:lstStyle/>
             <a:p>
               <a:r>
-                <a:rPr lang="en-US" sz="800" dirty="0" smtClean="0"/>
+                <a:rPr lang="en-US" sz="800" dirty="0"/>
                 <a:t>ID=1.3.3.0</a:t>
               </a:r>
-              <a:endParaRPr lang="en-US" sz="800" dirty="0"/>
             </a:p>
           </p:txBody>
         </p:sp>
@@ -5687,7 +5678,7 @@
           <a:p>
             <a:pPr algn="ctr"/>
             <a:r>
-              <a:rPr lang="en-US" sz="800" dirty="0" smtClean="0">
+              <a:rPr lang="en-US" sz="800" dirty="0">
                 <a:solidFill>
                   <a:schemeClr val="tx1"/>
                 </a:solidFill>
@@ -5720,10 +5711,9 @@
           <a:lstStyle/>
           <a:p>
             <a:r>
-              <a:rPr lang="en-US" sz="800" dirty="0" smtClean="0"/>
+              <a:rPr lang="en-US" sz="800" dirty="0"/>
               <a:t>ID=2.1.0.0</a:t>
             </a:r>
-            <a:endParaRPr lang="en-US" sz="800" dirty="0"/>
           </a:p>
         </p:txBody>
       </p:sp>
@@ -5770,7 +5760,7 @@
           <a:p>
             <a:pPr algn="ctr"/>
             <a:r>
-              <a:rPr lang="en-US" sz="800" dirty="0" smtClean="0">
+              <a:rPr lang="en-US" sz="800" dirty="0">
                 <a:solidFill>
                   <a:schemeClr val="tx1"/>
                 </a:solidFill>
@@ -5803,10 +5793,9 @@
           <a:lstStyle/>
           <a:p>
             <a:r>
-              <a:rPr lang="en-US" sz="800" dirty="0" smtClean="0"/>
+              <a:rPr lang="en-US" sz="800" dirty="0"/>
               <a:t>ID=2.2.0.0</a:t>
             </a:r>
-            <a:endParaRPr lang="en-US" sz="800" dirty="0"/>
           </a:p>
         </p:txBody>
       </p:sp>
@@ -5853,7 +5842,7 @@
           <a:p>
             <a:pPr algn="ctr"/>
             <a:r>
-              <a:rPr lang="en-US" sz="800" dirty="0" smtClean="0">
+              <a:rPr lang="en-US" sz="800" dirty="0">
                 <a:solidFill>
                   <a:schemeClr val="tx1"/>
                 </a:solidFill>
@@ -5886,10 +5875,9 @@
           <a:lstStyle/>
           <a:p>
             <a:r>
-              <a:rPr lang="en-US" sz="800" dirty="0" smtClean="0"/>
+              <a:rPr lang="en-US" sz="800" dirty="0"/>
               <a:t>ID=2.3.0.0</a:t>
             </a:r>
-            <a:endParaRPr lang="en-US" sz="800" dirty="0"/>
           </a:p>
         </p:txBody>
       </p:sp>
@@ -6094,10 +6082,9 @@
           <a:lstStyle/>
           <a:p>
             <a:r>
-              <a:rPr lang="en-US" sz="800" dirty="0" smtClean="0"/>
+              <a:rPr lang="en-US" sz="800" dirty="0"/>
               <a:t>ID=2.0.0.0</a:t>
             </a:r>
-            <a:endParaRPr lang="en-US" sz="800" dirty="0"/>
           </a:p>
         </p:txBody>
       </p:sp>
@@ -6193,7 +6180,7 @@
           <a:p>
             <a:pPr algn="ctr"/>
             <a:r>
-              <a:rPr lang="en-US" sz="800" dirty="0" smtClean="0">
+              <a:rPr lang="en-US" sz="800" dirty="0">
                 <a:solidFill>
                   <a:schemeClr val="tx1"/>
                 </a:solidFill>
@@ -6226,10 +6213,9 @@
           <a:lstStyle/>
           <a:p>
             <a:r>
-              <a:rPr lang="en-US" sz="800" dirty="0" smtClean="0"/>
+              <a:rPr lang="en-US" sz="800" dirty="0"/>
               <a:t>ID=2.2.1.0</a:t>
             </a:r>
-            <a:endParaRPr lang="en-US" sz="800" dirty="0"/>
           </a:p>
         </p:txBody>
       </p:sp>
@@ -6312,7 +6298,7 @@
           <a:p>
             <a:pPr algn="ctr"/>
             <a:r>
-              <a:rPr lang="en-US" sz="800" dirty="0" smtClean="0">
+              <a:rPr lang="en-US" sz="800" dirty="0">
                 <a:solidFill>
                   <a:schemeClr val="tx1"/>
                 </a:solidFill>
@@ -6320,14 +6306,14 @@
               <a:t>Type of</a:t>
             </a:r>
             <a:br>
-              <a:rPr lang="en-US" sz="800" dirty="0" smtClean="0">
+              <a:rPr lang="en-US" sz="800" dirty="0">
                 <a:solidFill>
                   <a:schemeClr val="tx1"/>
                 </a:solidFill>
               </a:rPr>
             </a:br>
             <a:r>
-              <a:rPr lang="en-US" sz="800" dirty="0" smtClean="0">
+              <a:rPr lang="en-US" sz="800" dirty="0">
                 <a:solidFill>
                   <a:schemeClr val="tx1"/>
                 </a:solidFill>
@@ -6360,10 +6346,9 @@
           <a:lstStyle/>
           <a:p>
             <a:r>
-              <a:rPr lang="en-US" sz="800" dirty="0" smtClean="0"/>
+              <a:rPr lang="en-US" sz="800" dirty="0"/>
               <a:t>ID=2.2.1.1</a:t>
             </a:r>
-            <a:endParaRPr lang="en-US" sz="800" dirty="0"/>
           </a:p>
         </p:txBody>
       </p:sp>
@@ -6410,7 +6395,7 @@
           <a:p>
             <a:pPr algn="ctr"/>
             <a:r>
-              <a:rPr lang="en-US" sz="800" dirty="0" smtClean="0">
+              <a:rPr lang="en-US" sz="800" dirty="0">
                 <a:solidFill>
                   <a:schemeClr val="tx1"/>
                 </a:solidFill>
@@ -6418,14 +6403,14 @@
               <a:t>Scope</a:t>
             </a:r>
             <a:br>
-              <a:rPr lang="en-US" sz="800" dirty="0" smtClean="0">
+              <a:rPr lang="en-US" sz="800" dirty="0">
                 <a:solidFill>
                   <a:schemeClr val="tx1"/>
                 </a:solidFill>
               </a:rPr>
             </a:br>
             <a:r>
-              <a:rPr lang="en-US" sz="800" dirty="0" smtClean="0">
+              <a:rPr lang="en-US" sz="800" dirty="0">
                 <a:solidFill>
                   <a:schemeClr val="tx1"/>
                 </a:solidFill>
@@ -6458,10 +6443,9 @@
           <a:lstStyle/>
           <a:p>
             <a:r>
-              <a:rPr lang="en-US" sz="800" dirty="0" smtClean="0"/>
+              <a:rPr lang="en-US" sz="800" dirty="0"/>
               <a:t>ID=2.2.1.1</a:t>
             </a:r>
-            <a:endParaRPr lang="en-US" sz="800" dirty="0"/>
           </a:p>
         </p:txBody>
       </p:sp>
@@ -6687,7 +6671,7 @@
           <a:p>
             <a:pPr algn="ctr"/>
             <a:r>
-              <a:rPr lang="en-US" sz="800" dirty="0" smtClean="0">
+              <a:rPr lang="en-US" sz="800" dirty="0">
                 <a:solidFill>
                   <a:schemeClr val="tx1"/>
                 </a:solidFill>
@@ -6720,10 +6704,9 @@
           <a:lstStyle/>
           <a:p>
             <a:r>
-              <a:rPr lang="en-US" sz="800" dirty="0" smtClean="0"/>
+              <a:rPr lang="en-US" sz="800" dirty="0"/>
               <a:t>ID=2.1.1.0</a:t>
             </a:r>
-            <a:endParaRPr lang="en-US" sz="800" dirty="0"/>
           </a:p>
         </p:txBody>
       </p:sp>
@@ -6806,7 +6789,7 @@
           <a:p>
             <a:pPr algn="ctr"/>
             <a:r>
-              <a:rPr lang="en-US" sz="800" dirty="0" smtClean="0">
+              <a:rPr lang="en-US" sz="800" dirty="0">
                 <a:solidFill>
                   <a:schemeClr val="tx1"/>
                 </a:solidFill>
@@ -6814,14 +6797,14 @@
               <a:t>Type of</a:t>
             </a:r>
             <a:br>
-              <a:rPr lang="en-US" sz="800" dirty="0" smtClean="0">
+              <a:rPr lang="en-US" sz="800" dirty="0">
                 <a:solidFill>
                   <a:schemeClr val="tx1"/>
                 </a:solidFill>
               </a:rPr>
             </a:br>
             <a:r>
-              <a:rPr lang="en-US" sz="800" dirty="0" smtClean="0">
+              <a:rPr lang="en-US" sz="800" dirty="0">
                 <a:solidFill>
                   <a:schemeClr val="tx1"/>
                 </a:solidFill>
@@ -6854,10 +6837,9 @@
           <a:lstStyle/>
           <a:p>
             <a:r>
-              <a:rPr lang="en-US" sz="800" dirty="0" smtClean="0"/>
+              <a:rPr lang="en-US" sz="800" dirty="0"/>
               <a:t>ID=2.1.1.1</a:t>
             </a:r>
-            <a:endParaRPr lang="en-US" sz="800" dirty="0"/>
           </a:p>
         </p:txBody>
       </p:sp>
@@ -6940,7 +6922,7 @@
           <a:p>
             <a:pPr algn="ctr"/>
             <a:r>
-              <a:rPr lang="en-US" sz="800" dirty="0" smtClean="0">
+              <a:rPr lang="en-US" sz="800" dirty="0">
                 <a:solidFill>
                   <a:schemeClr val="tx1"/>
                 </a:solidFill>
@@ -6948,14 +6930,14 @@
               <a:t>Scope</a:t>
             </a:r>
             <a:br>
-              <a:rPr lang="en-US" sz="800" dirty="0" smtClean="0">
+              <a:rPr lang="en-US" sz="800" dirty="0">
                 <a:solidFill>
                   <a:schemeClr val="tx1"/>
                 </a:solidFill>
               </a:rPr>
             </a:br>
             <a:r>
-              <a:rPr lang="en-US" sz="800" dirty="0" smtClean="0">
+              <a:rPr lang="en-US" sz="800" dirty="0">
                 <a:solidFill>
                   <a:schemeClr val="tx1"/>
                 </a:solidFill>
@@ -6988,10 +6970,9 @@
           <a:lstStyle/>
           <a:p>
             <a:r>
-              <a:rPr lang="en-US" sz="800" dirty="0" smtClean="0"/>
+              <a:rPr lang="en-US" sz="800" dirty="0"/>
               <a:t>ID=2.1.1.1</a:t>
             </a:r>
-            <a:endParaRPr lang="en-US" sz="800" dirty="0"/>
           </a:p>
         </p:txBody>
       </p:sp>
@@ -7074,7 +7055,7 @@
           <a:p>
             <a:pPr algn="ctr"/>
             <a:r>
-              <a:rPr lang="en-US" sz="800" dirty="0" smtClean="0">
+              <a:rPr lang="en-US" sz="800" dirty="0">
                 <a:solidFill>
                   <a:schemeClr val="tx1"/>
                 </a:solidFill>
@@ -7107,10 +7088,9 @@
           <a:lstStyle/>
           <a:p>
             <a:r>
-              <a:rPr lang="en-US" sz="800" dirty="0" smtClean="0"/>
+              <a:rPr lang="en-US" sz="800" dirty="0"/>
               <a:t>ID=2.3.1.0</a:t>
             </a:r>
-            <a:endParaRPr lang="en-US" sz="800" dirty="0"/>
           </a:p>
         </p:txBody>
       </p:sp>
@@ -7193,7 +7173,7 @@
           <a:p>
             <a:pPr algn="ctr"/>
             <a:r>
-              <a:rPr lang="en-US" sz="800" dirty="0" smtClean="0">
+              <a:rPr lang="en-US" sz="800" dirty="0">
                 <a:solidFill>
                   <a:schemeClr val="tx1"/>
                 </a:solidFill>
@@ -7201,14 +7181,14 @@
               <a:t>Type of</a:t>
             </a:r>
             <a:br>
-              <a:rPr lang="en-US" sz="800" dirty="0" smtClean="0">
+              <a:rPr lang="en-US" sz="800" dirty="0">
                 <a:solidFill>
                   <a:schemeClr val="tx1"/>
                 </a:solidFill>
               </a:rPr>
             </a:br>
             <a:r>
-              <a:rPr lang="en-US" sz="800" dirty="0" smtClean="0">
+              <a:rPr lang="en-US" sz="800" dirty="0">
                 <a:solidFill>
                   <a:schemeClr val="tx1"/>
                 </a:solidFill>
@@ -7241,10 +7221,9 @@
           <a:lstStyle/>
           <a:p>
             <a:r>
-              <a:rPr lang="en-US" sz="800" dirty="0" smtClean="0"/>
+              <a:rPr lang="en-US" sz="800" dirty="0"/>
               <a:t>ID=2.3.1.X</a:t>
             </a:r>
-            <a:endParaRPr lang="en-US" sz="800" dirty="0"/>
           </a:p>
         </p:txBody>
       </p:sp>
@@ -7291,7 +7270,7 @@
           <a:p>
             <a:pPr algn="ctr"/>
             <a:r>
-              <a:rPr lang="en-US" sz="800" dirty="0" smtClean="0">
+              <a:rPr lang="en-US" sz="800" dirty="0">
                 <a:solidFill>
                   <a:schemeClr val="tx1"/>
                 </a:solidFill>
@@ -7299,14 +7278,14 @@
               <a:t>Scope</a:t>
             </a:r>
             <a:br>
-              <a:rPr lang="en-US" sz="800" dirty="0" smtClean="0">
+              <a:rPr lang="en-US" sz="800" dirty="0">
                 <a:solidFill>
                   <a:schemeClr val="tx1"/>
                 </a:solidFill>
               </a:rPr>
             </a:br>
             <a:r>
-              <a:rPr lang="en-US" sz="800" dirty="0" smtClean="0">
+              <a:rPr lang="en-US" sz="800" dirty="0">
                 <a:solidFill>
                   <a:schemeClr val="tx1"/>
                 </a:solidFill>
@@ -7339,10 +7318,9 @@
           <a:lstStyle/>
           <a:p>
             <a:r>
-              <a:rPr lang="en-US" sz="800" dirty="0" smtClean="0"/>
+              <a:rPr lang="en-US" sz="800" dirty="0"/>
               <a:t>ID=2.3.1.X</a:t>
             </a:r>
-            <a:endParaRPr lang="en-US" sz="800" dirty="0"/>
           </a:p>
         </p:txBody>
       </p:sp>
@@ -7439,7 +7417,7 @@
             <a:p>
               <a:pPr algn="ctr"/>
               <a:r>
-                <a:rPr lang="en-US" sz="800" dirty="0" smtClean="0">
+                <a:rPr lang="en-US" sz="800" dirty="0">
                   <a:solidFill>
                     <a:schemeClr val="tx1"/>
                   </a:solidFill>
@@ -7492,7 +7470,7 @@
             <a:p>
               <a:pPr algn="ctr"/>
               <a:r>
-                <a:rPr lang="en-US" sz="800" dirty="0" smtClean="0">
+                <a:rPr lang="en-US" sz="800" dirty="0">
                   <a:solidFill>
                     <a:schemeClr val="tx1"/>
                   </a:solidFill>
@@ -7545,7 +7523,7 @@
             <a:p>
               <a:pPr algn="ctr"/>
               <a:r>
-                <a:rPr lang="en-US" sz="800" dirty="0" smtClean="0">
+                <a:rPr lang="en-US" sz="800" dirty="0">
                   <a:solidFill>
                     <a:schemeClr val="tx1"/>
                   </a:solidFill>
@@ -7578,10 +7556,9 @@
             <a:lstStyle/>
             <a:p>
               <a:r>
-                <a:rPr lang="en-US" sz="800" dirty="0" smtClean="0"/>
+                <a:rPr lang="en-US" sz="800" dirty="0"/>
                 <a:t>ID=2.1.1.1</a:t>
               </a:r>
-              <a:endParaRPr lang="en-US" sz="800" dirty="0"/>
             </a:p>
           </p:txBody>
         </p:sp>
@@ -7608,10 +7585,9 @@
             <a:lstStyle/>
             <a:p>
               <a:r>
-                <a:rPr lang="en-US" sz="800" dirty="0" smtClean="0"/>
+                <a:rPr lang="en-US" sz="800" dirty="0"/>
                 <a:t>ID=2.1.1.2</a:t>
               </a:r>
-              <a:endParaRPr lang="en-US" sz="800" dirty="0"/>
             </a:p>
           </p:txBody>
         </p:sp>
@@ -7638,10 +7614,9 @@
             <a:lstStyle/>
             <a:p>
               <a:r>
-                <a:rPr lang="en-US" sz="800" dirty="0" smtClean="0"/>
+                <a:rPr lang="en-US" sz="800" dirty="0"/>
                 <a:t>ID=2.1.1.3</a:t>
               </a:r>
-              <a:endParaRPr lang="en-US" sz="800" dirty="0"/>
             </a:p>
           </p:txBody>
         </p:sp>
@@ -7881,7 +7856,7 @@
             <a:p>
               <a:pPr algn="ctr"/>
               <a:r>
-                <a:rPr lang="en-US" sz="800" dirty="0" smtClean="0">
+                <a:rPr lang="en-US" sz="800" dirty="0">
                   <a:solidFill>
                     <a:schemeClr val="tx1"/>
                   </a:solidFill>
@@ -7934,7 +7909,7 @@
             <a:p>
               <a:pPr algn="ctr"/>
               <a:r>
-                <a:rPr lang="en-US" sz="800" dirty="0" smtClean="0">
+                <a:rPr lang="en-US" sz="800" dirty="0">
                   <a:solidFill>
                     <a:schemeClr val="tx1"/>
                   </a:solidFill>
@@ -7987,7 +7962,7 @@
             <a:p>
               <a:pPr algn="ctr"/>
               <a:r>
-                <a:rPr lang="en-US" sz="800" dirty="0" smtClean="0">
+                <a:rPr lang="en-US" sz="800" dirty="0">
                   <a:solidFill>
                     <a:schemeClr val="tx1"/>
                   </a:solidFill>
@@ -8020,10 +7995,9 @@
             <a:lstStyle/>
             <a:p>
               <a:r>
-                <a:rPr lang="en-US" sz="800" dirty="0" smtClean="0"/>
+                <a:rPr lang="en-US" sz="800" dirty="0"/>
                 <a:t>ID=2.1.1.1</a:t>
               </a:r>
-              <a:endParaRPr lang="en-US" sz="800" dirty="0"/>
             </a:p>
           </p:txBody>
         </p:sp>
@@ -8050,10 +8024,9 @@
             <a:lstStyle/>
             <a:p>
               <a:r>
-                <a:rPr lang="en-US" sz="800" dirty="0" smtClean="0"/>
+                <a:rPr lang="en-US" sz="800" dirty="0"/>
                 <a:t>ID=2.2.1.2</a:t>
               </a:r>
-              <a:endParaRPr lang="en-US" sz="800" dirty="0"/>
             </a:p>
           </p:txBody>
         </p:sp>
@@ -8080,10 +8053,9 @@
             <a:lstStyle/>
             <a:p>
               <a:r>
-                <a:rPr lang="en-US" sz="800" dirty="0" smtClean="0"/>
+                <a:rPr lang="en-US" sz="800" dirty="0"/>
                 <a:t>ID=2.1.1.3</a:t>
               </a:r>
-              <a:endParaRPr lang="en-US" sz="800" dirty="0"/>
             </a:p>
           </p:txBody>
         </p:sp>
@@ -8323,7 +8295,7 @@
             <a:p>
               <a:pPr algn="ctr"/>
               <a:r>
-                <a:rPr lang="en-US" sz="800" dirty="0" smtClean="0">
+                <a:rPr lang="en-US" sz="800" dirty="0">
                   <a:solidFill>
                     <a:schemeClr val="tx1"/>
                   </a:solidFill>
@@ -8376,7 +8348,7 @@
             <a:p>
               <a:pPr algn="ctr"/>
               <a:r>
-                <a:rPr lang="en-US" sz="800" dirty="0" smtClean="0">
+                <a:rPr lang="en-US" sz="800" dirty="0">
                   <a:solidFill>
                     <a:schemeClr val="tx1"/>
                   </a:solidFill>
@@ -8429,7 +8401,7 @@
             <a:p>
               <a:pPr algn="ctr"/>
               <a:r>
-                <a:rPr lang="en-US" sz="800" dirty="0" smtClean="0">
+                <a:rPr lang="en-US" sz="800" dirty="0">
                   <a:solidFill>
                     <a:schemeClr val="tx1"/>
                   </a:solidFill>
@@ -8462,10 +8434,9 @@
             <a:lstStyle/>
             <a:p>
               <a:r>
-                <a:rPr lang="en-US" sz="800" dirty="0" smtClean="0"/>
+                <a:rPr lang="en-US" sz="800" dirty="0"/>
                 <a:t>ID=2.3.1.1</a:t>
               </a:r>
-              <a:endParaRPr lang="en-US" sz="800" dirty="0"/>
             </a:p>
           </p:txBody>
         </p:sp>
@@ -8492,10 +8463,9 @@
             <a:lstStyle/>
             <a:p>
               <a:r>
-                <a:rPr lang="en-US" sz="800" dirty="0" smtClean="0"/>
+                <a:rPr lang="en-US" sz="800" dirty="0"/>
                 <a:t>ID=2.3.1.2</a:t>
               </a:r>
-              <a:endParaRPr lang="en-US" sz="800" dirty="0"/>
             </a:p>
           </p:txBody>
         </p:sp>
@@ -8522,10 +8492,9 @@
             <a:lstStyle/>
             <a:p>
               <a:r>
-                <a:rPr lang="en-US" sz="800" dirty="0" smtClean="0"/>
+                <a:rPr lang="en-US" sz="800" dirty="0"/>
                 <a:t>ID=2.3.1.3</a:t>
               </a:r>
-              <a:endParaRPr lang="en-US" sz="800" dirty="0"/>
             </a:p>
           </p:txBody>
         </p:sp>
@@ -9214,13 +9183,6 @@
   <p:clrMapOvr>
     <a:masterClrMapping/>
   </p:clrMapOvr>
-  <p:timing>
-    <p:tnLst>
-      <p:par>
-        <p:cTn id="1" dur="indefinite" restart="never" nodeType="tmRoot"/>
-      </p:par>
-    </p:tnLst>
-  </p:timing>
 </p:sld>
 </file>
 
@@ -9284,7 +9246,7 @@
           <a:p>
             <a:pPr algn="ctr"/>
             <a:r>
-              <a:rPr lang="en-US" sz="800" dirty="0" smtClean="0">
+              <a:rPr lang="en-US" sz="800" dirty="0">
                 <a:solidFill>
                   <a:schemeClr val="tx1"/>
                 </a:solidFill>
@@ -9373,7 +9335,7 @@
           <a:p>
             <a:pPr algn="ctr"/>
             <a:r>
-              <a:rPr lang="en-US" sz="800" dirty="0" smtClean="0">
+              <a:rPr lang="en-US" sz="800" dirty="0">
                 <a:solidFill>
                   <a:schemeClr val="tx1"/>
                 </a:solidFill>
@@ -9426,7 +9388,7 @@
           <a:p>
             <a:pPr algn="ctr"/>
             <a:r>
-              <a:rPr lang="en-US" sz="800" dirty="0" smtClean="0">
+              <a:rPr lang="en-US" sz="800" dirty="0">
                 <a:solidFill>
                   <a:schemeClr val="tx1"/>
                 </a:solidFill>
@@ -9586,7 +9548,7 @@
           <a:p>
             <a:pPr algn="ctr"/>
             <a:r>
-              <a:rPr lang="en-US" sz="800" dirty="0" smtClean="0">
+              <a:rPr lang="en-US" sz="800" dirty="0">
                 <a:solidFill>
                   <a:schemeClr val="tx1"/>
                 </a:solidFill>
@@ -9639,7 +9601,7 @@
           <a:p>
             <a:pPr algn="ctr"/>
             <a:r>
-              <a:rPr lang="en-US" sz="800" dirty="0" smtClean="0">
+              <a:rPr lang="en-US" sz="800" dirty="0">
                 <a:solidFill>
                   <a:schemeClr val="tx1"/>
                 </a:solidFill>
@@ -9692,7 +9654,7 @@
           <a:p>
             <a:pPr algn="ctr"/>
             <a:r>
-              <a:rPr lang="en-US" sz="800" dirty="0" smtClean="0">
+              <a:rPr lang="en-US" sz="800" dirty="0">
                 <a:solidFill>
                   <a:schemeClr val="tx1"/>
                 </a:solidFill>
@@ -9998,7 +9960,7 @@
           <a:p>
             <a:pPr algn="ctr"/>
             <a:r>
-              <a:rPr lang="en-US" sz="800" dirty="0" smtClean="0">
+              <a:rPr lang="en-US" sz="800" dirty="0">
                 <a:solidFill>
                   <a:schemeClr val="tx1"/>
                 </a:solidFill>
@@ -10051,7 +10013,7 @@
           <a:p>
             <a:pPr algn="ctr"/>
             <a:r>
-              <a:rPr lang="en-US" sz="800" dirty="0" smtClean="0">
+              <a:rPr lang="en-US" sz="800" dirty="0">
                 <a:solidFill>
                   <a:schemeClr val="tx1"/>
                 </a:solidFill>
@@ -10104,7 +10066,7 @@
           <a:p>
             <a:pPr algn="ctr"/>
             <a:r>
-              <a:rPr lang="en-US" sz="800" dirty="0" smtClean="0">
+              <a:rPr lang="en-US" sz="800" dirty="0">
                 <a:solidFill>
                   <a:schemeClr val="tx1"/>
                 </a:solidFill>
@@ -10157,7 +10119,7 @@
           <a:p>
             <a:pPr algn="ctr"/>
             <a:r>
-              <a:rPr lang="en-US" sz="800" dirty="0" smtClean="0">
+              <a:rPr lang="en-US" sz="800" dirty="0">
                 <a:solidFill>
                   <a:schemeClr val="tx1"/>
                 </a:solidFill>
@@ -10392,7 +10354,7 @@
           <a:p>
             <a:pPr algn="ctr"/>
             <a:r>
-              <a:rPr lang="en-US" sz="800" dirty="0" smtClean="0">
+              <a:rPr lang="en-US" sz="800" dirty="0">
                 <a:solidFill>
                   <a:schemeClr val="tx1"/>
                 </a:solidFill>
@@ -10516,7 +10478,7 @@
           <a:p>
             <a:pPr algn="ctr"/>
             <a:r>
-              <a:rPr lang="en-US" sz="800" dirty="0" smtClean="0">
+              <a:rPr lang="en-US" sz="800" dirty="0">
                 <a:solidFill>
                   <a:schemeClr val="tx1"/>
                 </a:solidFill>
@@ -10569,7 +10531,7 @@
           <a:p>
             <a:pPr algn="ctr"/>
             <a:r>
-              <a:rPr lang="en-US" sz="800" dirty="0" smtClean="0">
+              <a:rPr lang="en-US" sz="800" dirty="0">
                 <a:solidFill>
                   <a:schemeClr val="tx1"/>
                 </a:solidFill>
@@ -10622,7 +10584,7 @@
           <a:p>
             <a:pPr algn="ctr"/>
             <a:r>
-              <a:rPr lang="en-US" sz="800" dirty="0" smtClean="0">
+              <a:rPr lang="en-US" sz="800" dirty="0">
                 <a:solidFill>
                   <a:schemeClr val="tx1"/>
                 </a:solidFill>
@@ -10926,7 +10888,7 @@
           <a:p>
             <a:pPr algn="ctr"/>
             <a:r>
-              <a:rPr lang="en-US" sz="800" dirty="0" smtClean="0">
+              <a:rPr lang="en-US" sz="800" dirty="0">
                 <a:solidFill>
                   <a:schemeClr val="tx1"/>
                 </a:solidFill>
@@ -11075,7 +11037,7 @@
           <a:p>
             <a:pPr algn="ctr"/>
             <a:r>
-              <a:rPr lang="en-US" sz="800" dirty="0" smtClean="0">
+              <a:rPr lang="en-US" sz="800" dirty="0">
                 <a:solidFill>
                   <a:schemeClr val="tx1"/>
                 </a:solidFill>
@@ -11166,7 +11128,7 @@
           <a:p>
             <a:pPr algn="ctr"/>
             <a:r>
-              <a:rPr lang="en-US" sz="800" dirty="0" smtClean="0">
+              <a:rPr lang="en-US" sz="800" dirty="0">
                 <a:solidFill>
                   <a:schemeClr val="tx1"/>
                 </a:solidFill>
@@ -11255,7 +11217,7 @@
           <a:p>
             <a:pPr algn="ctr"/>
             <a:r>
-              <a:rPr lang="en-US" sz="800" dirty="0" smtClean="0">
+              <a:rPr lang="en-US" sz="800" dirty="0">
                 <a:solidFill>
                   <a:schemeClr val="tx1"/>
                 </a:solidFill>
@@ -11263,14 +11225,14 @@
               <a:t>OPEN</a:t>
             </a:r>
             <a:br>
-              <a:rPr lang="en-US" sz="800" dirty="0" smtClean="0">
+              <a:rPr lang="en-US" sz="800" dirty="0">
                 <a:solidFill>
                   <a:schemeClr val="tx1"/>
                 </a:solidFill>
               </a:rPr>
             </a:br>
             <a:r>
-              <a:rPr lang="en-US" sz="800" dirty="0" smtClean="0">
+              <a:rPr lang="en-US" sz="800" dirty="0">
                 <a:solidFill>
                   <a:schemeClr val="tx1"/>
                 </a:solidFill>
@@ -11323,7 +11285,7 @@
           <a:p>
             <a:pPr algn="ctr"/>
             <a:r>
-              <a:rPr lang="en-US" sz="800" dirty="0" smtClean="0">
+              <a:rPr lang="en-US" sz="800" dirty="0">
                 <a:solidFill>
                   <a:schemeClr val="tx1"/>
                 </a:solidFill>
@@ -11549,18 +11511,13 @@
           <a:p>
             <a:pPr algn="ctr"/>
             <a:r>
-              <a:rPr lang="en-US" sz="800" dirty="0" smtClean="0">
+              <a:rPr lang="en-US" sz="800" dirty="0">
                 <a:solidFill>
                   <a:schemeClr val="tx1"/>
                 </a:solidFill>
               </a:rPr>
               <a:t>Application Form</a:t>
             </a:r>
-            <a:endParaRPr lang="en-US" sz="800" dirty="0">
-              <a:solidFill>
-                <a:schemeClr val="tx1"/>
-              </a:solidFill>
-            </a:endParaRPr>
           </a:p>
         </p:txBody>
       </p:sp>
@@ -11588,10 +11545,9 @@
           <a:p>
             <a:pPr algn="ctr"/>
             <a:r>
-              <a:rPr lang="en-US" dirty="0" smtClean="0"/>
+              <a:rPr lang="en-US" dirty="0"/>
               <a:t>Tech</a:t>
             </a:r>
-            <a:endParaRPr lang="en-US" dirty="0"/>
           </a:p>
         </p:txBody>
       </p:sp>
@@ -11618,37 +11574,36 @@
           <a:lstStyle/>
           <a:p>
             <a:r>
-              <a:rPr lang="en-US" sz="800" dirty="0" smtClean="0"/>
+              <a:rPr lang="en-US" sz="800" dirty="0"/>
               <a:t>EXTERNAL DBASE</a:t>
             </a:r>
           </a:p>
           <a:p>
             <a:r>
-              <a:rPr lang="en-US" sz="800" dirty="0" smtClean="0"/>
+              <a:rPr lang="en-US" sz="800" dirty="0"/>
               <a:t>IDEAPP=  + #Auto</a:t>
             </a:r>
           </a:p>
           <a:p>
             <a:r>
-              <a:rPr lang="en-US" sz="800" dirty="0" smtClean="0"/>
+              <a:rPr lang="en-US" sz="800" dirty="0"/>
               <a:t>External Input data</a:t>
             </a:r>
           </a:p>
           <a:p>
-            <a:endParaRPr lang="en-US" sz="800" dirty="0" smtClean="0"/>
-          </a:p>
-          <a:p>
-            <a:r>
-              <a:rPr lang="en-US" sz="800" dirty="0" smtClean="0"/>
+            <a:endParaRPr lang="en-US" sz="800" dirty="0"/>
+          </a:p>
+          <a:p>
+            <a:r>
+              <a:rPr lang="en-US" sz="800" dirty="0"/>
               <a:t>[Contact info]</a:t>
             </a:r>
           </a:p>
           <a:p>
             <a:r>
-              <a:rPr lang="en-US" sz="800" dirty="0" smtClean="0"/>
+              <a:rPr lang="en-US" sz="800" dirty="0"/>
               <a:t>[Work Experience]</a:t>
             </a:r>
-            <a:endParaRPr lang="en-US" sz="800" dirty="0"/>
           </a:p>
         </p:txBody>
       </p:sp>
@@ -11695,7 +11650,7 @@
           <a:p>
             <a:pPr algn="ctr"/>
             <a:r>
-              <a:rPr lang="en-US" sz="800" dirty="0" smtClean="0">
+              <a:rPr lang="en-US" sz="800" dirty="0">
                 <a:solidFill>
                   <a:schemeClr val="tx1"/>
                 </a:solidFill>
@@ -11728,16 +11683,15 @@
           <a:lstStyle/>
           <a:p>
             <a:r>
-              <a:rPr lang="en-US" sz="800" dirty="0" smtClean="0"/>
+              <a:rPr lang="en-US" sz="800" dirty="0"/>
               <a:t>IDEAPP= #</a:t>
             </a:r>
           </a:p>
           <a:p>
             <a:r>
-              <a:rPr lang="en-US" sz="800" dirty="0" smtClean="0"/>
+              <a:rPr lang="en-US" sz="800" dirty="0"/>
               <a:t>Verify Profile Info</a:t>
             </a:r>
-            <a:endParaRPr lang="en-US" sz="800" dirty="0"/>
           </a:p>
         </p:txBody>
       </p:sp>
@@ -11822,7 +11776,7 @@
           <a:p>
             <a:pPr algn="ctr"/>
             <a:r>
-              <a:rPr lang="en-US" sz="800" dirty="0" smtClean="0">
+              <a:rPr lang="en-US" sz="800" dirty="0">
                 <a:solidFill>
                   <a:schemeClr val="tx1"/>
                 </a:solidFill>
@@ -11855,16 +11809,15 @@
           <a:lstStyle/>
           <a:p>
             <a:r>
-              <a:rPr lang="en-US" sz="800" dirty="0" smtClean="0"/>
+              <a:rPr lang="en-US" sz="800" dirty="0"/>
               <a:t>DB.AXIS.TEDHID=</a:t>
             </a:r>
           </a:p>
           <a:p>
             <a:r>
-              <a:rPr lang="en-US" sz="800" dirty="0" smtClean="0"/>
+              <a:rPr lang="en-US" sz="800" dirty="0"/>
               <a:t>IDEAPP</a:t>
             </a:r>
-            <a:endParaRPr lang="en-US" sz="800" dirty="0"/>
           </a:p>
         </p:txBody>
       </p:sp>
@@ -11911,7 +11864,7 @@
           <a:p>
             <a:pPr algn="ctr"/>
             <a:r>
-              <a:rPr lang="en-US" sz="800" dirty="0" smtClean="0">
+              <a:rPr lang="en-US" sz="800" dirty="0">
                 <a:solidFill>
                   <a:schemeClr val="tx1"/>
                 </a:solidFill>
@@ -11964,7 +11917,7 @@
           <a:p>
             <a:pPr algn="ctr"/>
             <a:r>
-              <a:rPr lang="en-US" sz="800" dirty="0" smtClean="0">
+              <a:rPr lang="en-US" sz="800" dirty="0">
                 <a:solidFill>
                   <a:schemeClr val="tx1"/>
                 </a:solidFill>
@@ -12017,7 +11970,7 @@
           <a:p>
             <a:pPr algn="ctr"/>
             <a:r>
-              <a:rPr lang="en-US" sz="800" dirty="0" smtClean="0">
+              <a:rPr lang="en-US" sz="800" dirty="0">
                 <a:solidFill>
                   <a:schemeClr val="tx1"/>
                 </a:solidFill>
@@ -12221,7 +12174,7 @@
           <a:p>
             <a:pPr algn="ctr"/>
             <a:r>
-              <a:rPr lang="en-US" sz="800" dirty="0" smtClean="0">
+              <a:rPr lang="en-US" sz="800" dirty="0">
                 <a:solidFill>
                   <a:schemeClr val="tx1"/>
                 </a:solidFill>
@@ -12274,7 +12227,7 @@
           <a:p>
             <a:pPr algn="ctr"/>
             <a:r>
-              <a:rPr lang="en-US" sz="800" dirty="0" smtClean="0">
+              <a:rPr lang="en-US" sz="800" dirty="0">
                 <a:solidFill>
                   <a:schemeClr val="tx1"/>
                 </a:solidFill>
@@ -12363,7 +12316,7 @@
           <a:p>
             <a:pPr algn="ctr"/>
             <a:r>
-              <a:rPr lang="en-US" sz="800" dirty="0" smtClean="0">
+              <a:rPr lang="en-US" sz="800" dirty="0">
                 <a:solidFill>
                   <a:schemeClr val="tx1"/>
                 </a:solidFill>
@@ -12396,31 +12349,31 @@
           <a:lstStyle/>
           <a:p>
             <a:r>
-              <a:rPr lang="en-US" sz="800" dirty="0" smtClean="0"/>
+              <a:rPr lang="en-US" sz="800" dirty="0"/>
               <a:t>DB.AXIS</a:t>
             </a:r>
           </a:p>
           <a:p>
             <a:r>
-              <a:rPr lang="en-US" sz="800" dirty="0" smtClean="0"/>
+              <a:rPr lang="en-US" sz="800" dirty="0"/>
               <a:t>New</a:t>
             </a:r>
           </a:p>
           <a:p>
             <a:r>
-              <a:rPr lang="en-US" sz="800" dirty="0" smtClean="0"/>
+              <a:rPr lang="en-US" sz="800" dirty="0"/>
               <a:t>Email User</a:t>
             </a:r>
           </a:p>
           <a:p>
             <a:r>
-              <a:rPr lang="en-US" sz="800" dirty="0" smtClean="0"/>
+              <a:rPr lang="en-US" sz="800" dirty="0"/>
               <a:t>Password</a:t>
             </a:r>
           </a:p>
           <a:p>
             <a:r>
-              <a:rPr lang="en-US" sz="800" dirty="0" smtClean="0"/>
+              <a:rPr lang="en-US" sz="800" dirty="0"/>
               <a:t>Profile = Tech</a:t>
             </a:r>
           </a:p>
@@ -12488,10 +12441,9 @@
           <a:lstStyle/>
           <a:p>
             <a:r>
-              <a:rPr lang="en-US" sz="800" dirty="0" smtClean="0"/>
+              <a:rPr lang="en-US" sz="800" dirty="0"/>
               <a:t>USER?</a:t>
             </a:r>
-            <a:endParaRPr lang="en-US" sz="800" dirty="0"/>
           </a:p>
         </p:txBody>
       </p:sp>
@@ -12574,7 +12526,7 @@
           <a:p>
             <a:pPr algn="ctr"/>
             <a:r>
-              <a:rPr lang="en-US" sz="800" dirty="0" smtClean="0">
+              <a:rPr lang="en-US" sz="800" dirty="0">
                 <a:solidFill>
                   <a:schemeClr val="tx1"/>
                 </a:solidFill>
@@ -12627,7 +12579,7 @@
           <a:p>
             <a:pPr algn="ctr"/>
             <a:r>
-              <a:rPr lang="en-US" sz="800" dirty="0" smtClean="0">
+              <a:rPr lang="en-US" sz="800" dirty="0">
                 <a:solidFill>
                   <a:schemeClr val="tx1"/>
                 </a:solidFill>
@@ -12756,7 +12708,7 @@
           <a:p>
             <a:pPr algn="ctr"/>
             <a:r>
-              <a:rPr lang="en-US" sz="800" dirty="0" smtClean="0">
+              <a:rPr lang="en-US" sz="800" dirty="0">
                 <a:solidFill>
                   <a:schemeClr val="tx1"/>
                 </a:solidFill>
@@ -12789,16 +12741,15 @@
           <a:lstStyle/>
           <a:p>
             <a:r>
-              <a:rPr lang="en-US" sz="800" dirty="0" smtClean="0"/>
+              <a:rPr lang="en-US" sz="800" dirty="0"/>
               <a:t>DB.AXIS.TEDHID</a:t>
             </a:r>
           </a:p>
           <a:p>
             <a:r>
-              <a:rPr lang="en-US" sz="800" dirty="0" smtClean="0"/>
+              <a:rPr lang="en-US" sz="800" dirty="0"/>
               <a:t>Fill info with Catalog</a:t>
             </a:r>
-            <a:endParaRPr lang="en-US" sz="800" dirty="0"/>
           </a:p>
         </p:txBody>
       </p:sp>
@@ -12845,7 +12796,7 @@
           <a:p>
             <a:pPr algn="ctr"/>
             <a:r>
-              <a:rPr lang="en-US" sz="800" dirty="0" smtClean="0">
+              <a:rPr lang="en-US" sz="800" dirty="0">
                 <a:solidFill>
                   <a:schemeClr val="tx1"/>
                 </a:solidFill>
@@ -12898,7 +12849,7 @@
           <a:p>
             <a:pPr algn="ctr"/>
             <a:r>
-              <a:rPr lang="en-US" sz="800" dirty="0" err="1" smtClean="0">
+              <a:rPr lang="en-US" sz="800" dirty="0" err="1">
                 <a:solidFill>
                   <a:schemeClr val="tx1"/>
                 </a:solidFill>
@@ -12906,7 +12857,7 @@
               <a:t>Brackground</a:t>
             </a:r>
             <a:r>
-              <a:rPr lang="en-US" sz="800" dirty="0" smtClean="0">
+              <a:rPr lang="en-US" sz="800" dirty="0">
                 <a:solidFill>
                   <a:schemeClr val="tx1"/>
                 </a:solidFill>
@@ -12940,10 +12891,9 @@
           <a:p>
             <a:pPr algn="ctr"/>
             <a:r>
-              <a:rPr lang="en-US" sz="800" dirty="0" smtClean="0"/>
+              <a:rPr lang="en-US" sz="800" dirty="0"/>
               <a:t>File</a:t>
             </a:r>
-            <a:endParaRPr lang="en-US" sz="800" dirty="0"/>
           </a:p>
         </p:txBody>
       </p:sp>
@@ -12971,10 +12921,9 @@
           <a:p>
             <a:pPr algn="ctr"/>
             <a:r>
-              <a:rPr lang="en-US" sz="800" dirty="0" smtClean="0"/>
+              <a:rPr lang="en-US" sz="800" dirty="0"/>
               <a:t>File</a:t>
             </a:r>
-            <a:endParaRPr lang="en-US" sz="800" dirty="0"/>
           </a:p>
         </p:txBody>
       </p:sp>
@@ -13131,7 +13080,7 @@
           <a:p>
             <a:pPr algn="ctr"/>
             <a:r>
-              <a:rPr lang="en-US" sz="800" dirty="0" err="1" smtClean="0">
+              <a:rPr lang="en-US" sz="800" dirty="0" err="1">
                 <a:solidFill>
                   <a:schemeClr val="tx1"/>
                 </a:solidFill>
@@ -13139,7 +13088,7 @@
               <a:t>Acept</a:t>
             </a:r>
             <a:r>
-              <a:rPr lang="en-US" sz="800" dirty="0" smtClean="0">
+              <a:rPr lang="en-US" sz="800" dirty="0">
                 <a:solidFill>
                   <a:schemeClr val="tx1"/>
                 </a:solidFill>
@@ -13264,7 +13213,7 @@
           <a:p>
             <a:pPr algn="ctr"/>
             <a:r>
-              <a:rPr lang="en-US" sz="800" dirty="0" smtClean="0">
+              <a:rPr lang="en-US" sz="800" dirty="0">
                 <a:solidFill>
                   <a:schemeClr val="tx1"/>
                 </a:solidFill>
@@ -13391,7 +13340,7 @@
           <a:p>
             <a:pPr algn="ctr"/>
             <a:r>
-              <a:rPr lang="en-US" sz="800" dirty="0" smtClean="0">
+              <a:rPr lang="en-US" sz="800" dirty="0">
                 <a:solidFill>
                   <a:schemeClr val="tx1"/>
                 </a:solidFill>
@@ -13444,7 +13393,7 @@
           <a:p>
             <a:pPr algn="ctr"/>
             <a:r>
-              <a:rPr lang="en-US" sz="800" dirty="0" smtClean="0">
+              <a:rPr lang="en-US" sz="800" dirty="0">
                 <a:solidFill>
                   <a:schemeClr val="tx1"/>
                 </a:solidFill>
@@ -13549,22 +13498,21 @@
           <a:lstStyle/>
           <a:p>
             <a:r>
-              <a:rPr lang="en-US" sz="800" dirty="0" smtClean="0"/>
+              <a:rPr lang="en-US" sz="800" dirty="0"/>
               <a:t>System</a:t>
             </a:r>
           </a:p>
           <a:p>
             <a:r>
-              <a:rPr lang="en-US" sz="800" dirty="0" smtClean="0"/>
+              <a:rPr lang="en-US" sz="800" dirty="0"/>
               <a:t>1. Send Email</a:t>
             </a:r>
           </a:p>
           <a:p>
             <a:r>
-              <a:rPr lang="en-US" sz="800" dirty="0" smtClean="0"/>
+              <a:rPr lang="en-US" sz="800" dirty="0"/>
               <a:t>2. Delete Axis Access</a:t>
             </a:r>
-            <a:endParaRPr lang="en-US" sz="800" dirty="0"/>
           </a:p>
         </p:txBody>
       </p:sp>
@@ -13681,13 +13629,6 @@
   <p:clrMapOvr>
     <a:masterClrMapping/>
   </p:clrMapOvr>
-  <p:timing>
-    <p:tnLst>
-      <p:par>
-        <p:cTn id="1" dur="indefinite" restart="never" nodeType="tmRoot"/>
-      </p:par>
-    </p:tnLst>
-  </p:timing>
 </p:sld>
 </file>
 
@@ -13751,7 +13692,7 @@
           <a:p>
             <a:pPr algn="ctr"/>
             <a:r>
-              <a:rPr lang="en-US" sz="800" dirty="0" smtClean="0">
+              <a:rPr lang="en-US" sz="800" dirty="0">
                 <a:solidFill>
                   <a:schemeClr val="tx1"/>
                 </a:solidFill>
@@ -13840,7 +13781,7 @@
           <a:p>
             <a:pPr algn="ctr"/>
             <a:r>
-              <a:rPr lang="en-US" sz="800" dirty="0" smtClean="0">
+              <a:rPr lang="en-US" sz="800" dirty="0">
                 <a:solidFill>
                   <a:schemeClr val="tx1"/>
                 </a:solidFill>
@@ -13848,14 +13789,14 @@
               <a:t>TECH</a:t>
             </a:r>
             <a:br>
-              <a:rPr lang="en-US" sz="800" dirty="0" smtClean="0">
+              <a:rPr lang="en-US" sz="800" dirty="0">
                 <a:solidFill>
                   <a:schemeClr val="tx1"/>
                 </a:solidFill>
               </a:rPr>
             </a:br>
             <a:r>
-              <a:rPr lang="en-US" sz="800" dirty="0" smtClean="0">
+              <a:rPr lang="en-US" sz="800" dirty="0">
                 <a:solidFill>
                   <a:schemeClr val="tx1"/>
                 </a:solidFill>
@@ -13944,7 +13885,7 @@
           <a:p>
             <a:pPr algn="ctr"/>
             <a:r>
-              <a:rPr lang="en-US" sz="800" dirty="0" smtClean="0">
+              <a:rPr lang="en-US" sz="800" dirty="0">
                 <a:solidFill>
                   <a:schemeClr val="tx1"/>
                 </a:solidFill>
@@ -14033,7 +13974,7 @@
           <a:p>
             <a:pPr algn="ctr"/>
             <a:r>
-              <a:rPr lang="en-US" sz="800" dirty="0" smtClean="0">
+              <a:rPr lang="en-US" sz="800" dirty="0">
                 <a:solidFill>
                   <a:schemeClr val="tx1"/>
                 </a:solidFill>
@@ -14122,7 +14063,7 @@
           <a:p>
             <a:pPr algn="ctr"/>
             <a:r>
-              <a:rPr lang="en-US" sz="800" dirty="0" smtClean="0">
+              <a:rPr lang="en-US" sz="800" dirty="0">
                 <a:solidFill>
                   <a:schemeClr val="tx1"/>
                 </a:solidFill>
@@ -14246,7 +14187,7 @@
           <a:p>
             <a:pPr algn="ctr"/>
             <a:r>
-              <a:rPr lang="en-US" sz="800" dirty="0" smtClean="0">
+              <a:rPr lang="en-US" sz="800" dirty="0">
                 <a:solidFill>
                   <a:schemeClr val="tx1"/>
                 </a:solidFill>
@@ -14406,7 +14347,7 @@
           <a:p>
             <a:pPr algn="ctr"/>
             <a:r>
-              <a:rPr lang="en-US" sz="800" dirty="0" smtClean="0">
+              <a:rPr lang="en-US" sz="800" dirty="0">
                 <a:solidFill>
                   <a:schemeClr val="tx1"/>
                 </a:solidFill>
@@ -14495,7 +14436,7 @@
           <a:p>
             <a:pPr algn="ctr"/>
             <a:r>
-              <a:rPr lang="en-US" sz="800" dirty="0" smtClean="0">
+              <a:rPr lang="en-US" sz="800" dirty="0">
                 <a:solidFill>
                   <a:schemeClr val="tx1"/>
                 </a:solidFill>
@@ -14655,7 +14596,7 @@
           <a:p>
             <a:pPr algn="ctr"/>
             <a:r>
-              <a:rPr lang="en-US" sz="800" dirty="0" smtClean="0">
+              <a:rPr lang="en-US" sz="800" dirty="0">
                 <a:solidFill>
                   <a:schemeClr val="tx1"/>
                 </a:solidFill>
@@ -14744,7 +14685,7 @@
           <a:p>
             <a:pPr algn="ctr"/>
             <a:r>
-              <a:rPr lang="en-US" sz="800" dirty="0" smtClean="0">
+              <a:rPr lang="en-US" sz="800" dirty="0">
                 <a:solidFill>
                   <a:schemeClr val="tx1"/>
                 </a:solidFill>
@@ -14833,7 +14774,7 @@
           <a:p>
             <a:pPr algn="ctr"/>
             <a:r>
-              <a:rPr lang="en-US" sz="800" dirty="0" smtClean="0">
+              <a:rPr lang="en-US" sz="800" dirty="0">
                 <a:solidFill>
                   <a:schemeClr val="tx1"/>
                 </a:solidFill>
@@ -14922,7 +14863,7 @@
           <a:p>
             <a:pPr algn="ctr"/>
             <a:r>
-              <a:rPr lang="en-US" sz="800" dirty="0" smtClean="0">
+              <a:rPr lang="en-US" sz="800" dirty="0">
                 <a:solidFill>
                   <a:schemeClr val="tx1"/>
                 </a:solidFill>
@@ -15011,7 +14952,7 @@
           <a:p>
             <a:pPr algn="ctr"/>
             <a:r>
-              <a:rPr lang="en-US" sz="800" dirty="0" smtClean="0">
+              <a:rPr lang="en-US" sz="800" dirty="0">
                 <a:solidFill>
                   <a:schemeClr val="tx1"/>
                 </a:solidFill>
@@ -15080,10 +15021,9 @@
           <a:lstStyle/>
           <a:p>
             <a:r>
-              <a:rPr lang="en-US" sz="1000" dirty="0" smtClean="0"/>
+              <a:rPr lang="en-US" sz="1000" dirty="0"/>
               <a:t>Y</a:t>
             </a:r>
-            <a:endParaRPr lang="en-US" sz="1000" dirty="0"/>
           </a:p>
         </p:txBody>
       </p:sp>
@@ -15130,7 +15070,7 @@
           <a:p>
             <a:pPr algn="ctr"/>
             <a:r>
-              <a:rPr lang="en-US" sz="800" dirty="0" smtClean="0">
+              <a:rPr lang="en-US" sz="800" dirty="0">
                 <a:solidFill>
                   <a:schemeClr val="tx1"/>
                 </a:solidFill>
@@ -15201,10 +15141,9 @@
           <a:lstStyle/>
           <a:p>
             <a:r>
-              <a:rPr lang="en-US" sz="1000" dirty="0" smtClean="0"/>
+              <a:rPr lang="en-US" sz="1000" dirty="0"/>
               <a:t>N</a:t>
             </a:r>
-            <a:endParaRPr lang="en-US" sz="1000" dirty="0"/>
           </a:p>
         </p:txBody>
       </p:sp>
@@ -15251,7 +15190,7 @@
           <a:p>
             <a:pPr algn="ctr"/>
             <a:r>
-              <a:rPr lang="en-US" sz="800" dirty="0" smtClean="0">
+              <a:rPr lang="en-US" sz="800" dirty="0">
                 <a:solidFill>
                   <a:schemeClr val="tx1"/>
                 </a:solidFill>
@@ -15338,13 +15277,6 @@
   <p:clrMapOvr>
     <a:masterClrMapping/>
   </p:clrMapOvr>
-  <p:timing>
-    <p:tnLst>
-      <p:par>
-        <p:cTn id="1" dur="indefinite" restart="never" nodeType="tmRoot"/>
-      </p:par>
-    </p:tnLst>
-  </p:timing>
 </p:sld>
 </file>
 
@@ -15408,7 +15340,7 @@
           <a:p>
             <a:pPr algn="ctr"/>
             <a:r>
-              <a:rPr lang="en-US" sz="800" dirty="0" smtClean="0">
+              <a:rPr lang="en-US" sz="800" dirty="0">
                 <a:solidFill>
                   <a:schemeClr val="tx1"/>
                 </a:solidFill>
@@ -15497,7 +15429,7 @@
           <a:p>
             <a:pPr algn="ctr"/>
             <a:r>
-              <a:rPr lang="en-US" sz="800" dirty="0" smtClean="0">
+              <a:rPr lang="en-US" sz="800" dirty="0">
                 <a:solidFill>
                   <a:schemeClr val="tx1"/>
                 </a:solidFill>
@@ -15550,7 +15482,7 @@
           <a:p>
             <a:pPr algn="ctr"/>
             <a:r>
-              <a:rPr lang="en-US" sz="800" dirty="0" smtClean="0">
+              <a:rPr lang="en-US" sz="800" dirty="0">
                 <a:solidFill>
                   <a:schemeClr val="tx1"/>
                 </a:solidFill>
@@ -15746,7 +15678,7 @@
           <a:p>
             <a:pPr algn="ctr"/>
             <a:r>
-              <a:rPr lang="en-US" sz="800" dirty="0" smtClean="0">
+              <a:rPr lang="en-US" sz="800" dirty="0">
                 <a:solidFill>
                   <a:schemeClr val="tx1"/>
                 </a:solidFill>
@@ -15835,7 +15767,7 @@
           <a:p>
             <a:pPr algn="ctr"/>
             <a:r>
-              <a:rPr lang="en-US" sz="800" dirty="0" smtClean="0">
+              <a:rPr lang="en-US" sz="800" dirty="0">
                 <a:solidFill>
                   <a:schemeClr val="tx1"/>
                 </a:solidFill>
@@ -15924,7 +15856,7 @@
           <a:p>
             <a:pPr algn="ctr"/>
             <a:r>
-              <a:rPr lang="en-US" sz="800" dirty="0" smtClean="0">
+              <a:rPr lang="en-US" sz="800" dirty="0">
                 <a:solidFill>
                   <a:schemeClr val="tx1"/>
                 </a:solidFill>
@@ -15998,10 +15930,9 @@
           <a:lstStyle/>
           <a:p>
             <a:r>
-              <a:rPr lang="en-US" sz="800" dirty="0" smtClean="0"/>
+              <a:rPr lang="en-US" sz="800" dirty="0"/>
               <a:t>NO</a:t>
             </a:r>
-            <a:endParaRPr lang="en-US" sz="800" dirty="0"/>
           </a:p>
         </p:txBody>
       </p:sp>
@@ -16086,7 +16017,7 @@
           <a:p>
             <a:pPr algn="ctr"/>
             <a:r>
-              <a:rPr lang="en-US" sz="800" dirty="0" smtClean="0">
+              <a:rPr lang="en-US" sz="800" dirty="0">
                 <a:solidFill>
                   <a:schemeClr val="tx1"/>
                 </a:solidFill>
@@ -16139,7 +16070,7 @@
           <a:p>
             <a:pPr algn="ctr"/>
             <a:r>
-              <a:rPr lang="en-US" sz="800" dirty="0" smtClean="0">
+              <a:rPr lang="en-US" sz="800" dirty="0">
                 <a:solidFill>
                   <a:schemeClr val="tx1"/>
                 </a:solidFill>
@@ -16192,7 +16123,7 @@
           <a:p>
             <a:pPr algn="ctr"/>
             <a:r>
-              <a:rPr lang="en-US" sz="800" dirty="0" smtClean="0">
+              <a:rPr lang="en-US" sz="800" dirty="0">
                 <a:solidFill>
                   <a:schemeClr val="tx1"/>
                 </a:solidFill>
@@ -16368,10 +16299,9 @@
           <a:lstStyle/>
           <a:p>
             <a:r>
-              <a:rPr lang="en-US" sz="800" dirty="0" smtClean="0"/>
+              <a:rPr lang="en-US" sz="800" dirty="0"/>
               <a:t>YES</a:t>
             </a:r>
-            <a:endParaRPr lang="en-US" sz="800" dirty="0"/>
           </a:p>
         </p:txBody>
       </p:sp>
@@ -16454,7 +16384,7 @@
           <a:p>
             <a:pPr algn="ctr"/>
             <a:r>
-              <a:rPr lang="en-US" sz="800" dirty="0" smtClean="0">
+              <a:rPr lang="en-US" sz="800" dirty="0">
                 <a:solidFill>
                   <a:schemeClr val="tx1"/>
                 </a:solidFill>
@@ -16507,7 +16437,7 @@
           <a:p>
             <a:pPr algn="ctr"/>
             <a:r>
-              <a:rPr lang="en-US" sz="800" dirty="0" smtClean="0">
+              <a:rPr lang="en-US" sz="800" dirty="0">
                 <a:solidFill>
                   <a:schemeClr val="tx1"/>
                 </a:solidFill>
@@ -16810,7 +16740,7 @@
           <a:p>
             <a:pPr algn="ctr"/>
             <a:r>
-              <a:rPr lang="en-US" sz="700" dirty="0" smtClean="0">
+              <a:rPr lang="en-US" sz="700" dirty="0">
                 <a:solidFill>
                   <a:schemeClr val="tx1"/>
                 </a:solidFill>
@@ -16920,10 +16850,9 @@
           <a:lstStyle/>
           <a:p>
             <a:r>
-              <a:rPr lang="en-US" sz="800" dirty="0" smtClean="0"/>
+              <a:rPr lang="en-US" sz="800" dirty="0"/>
               <a:t>NO</a:t>
             </a:r>
-            <a:endParaRPr lang="en-US" sz="800" dirty="0"/>
           </a:p>
         </p:txBody>
       </p:sp>
@@ -16950,10 +16879,9 @@
           <a:lstStyle/>
           <a:p>
             <a:r>
-              <a:rPr lang="en-US" sz="800" dirty="0" smtClean="0"/>
+              <a:rPr lang="en-US" sz="800" dirty="0"/>
               <a:t>YES</a:t>
             </a:r>
-            <a:endParaRPr lang="en-US" sz="800" dirty="0"/>
           </a:p>
         </p:txBody>
       </p:sp>
@@ -17111,7 +17039,7 @@
           <a:lstStyle/>
           <a:p>
             <a:r>
-              <a:rPr lang="en-US" sz="800" dirty="0" smtClean="0">
+              <a:rPr lang="en-US" sz="800" dirty="0">
                 <a:solidFill>
                   <a:schemeClr val="tx1"/>
                 </a:solidFill>
@@ -17119,14 +17047,14 @@
               <a:t>PDF FILE</a:t>
             </a:r>
             <a:br>
-              <a:rPr lang="en-US" sz="800" dirty="0" smtClean="0">
+              <a:rPr lang="en-US" sz="800" dirty="0">
                 <a:solidFill>
                   <a:schemeClr val="tx1"/>
                 </a:solidFill>
               </a:rPr>
             </a:br>
             <a:r>
-              <a:rPr lang="en-US" sz="800" dirty="0" smtClean="0">
+              <a:rPr lang="en-US" sz="800" dirty="0">
                 <a:solidFill>
                   <a:schemeClr val="tx1"/>
                 </a:solidFill>
@@ -17134,14 +17062,14 @@
               <a:t>COST</a:t>
             </a:r>
             <a:br>
-              <a:rPr lang="en-US" sz="800" dirty="0" smtClean="0">
+              <a:rPr lang="en-US" sz="800" dirty="0">
                 <a:solidFill>
                   <a:schemeClr val="tx1"/>
                 </a:solidFill>
               </a:rPr>
             </a:br>
             <a:r>
-              <a:rPr lang="en-US" sz="800" dirty="0" smtClean="0">
+              <a:rPr lang="en-US" sz="800" dirty="0">
                 <a:solidFill>
                   <a:srgbClr val="FF0000"/>
                 </a:solidFill>
@@ -17194,7 +17122,7 @@
           <a:p>
             <a:pPr algn="ctr"/>
             <a:r>
-              <a:rPr lang="en-US" sz="800" dirty="0" smtClean="0">
+              <a:rPr lang="en-US" sz="800" dirty="0">
                 <a:solidFill>
                   <a:schemeClr val="tx1"/>
                 </a:solidFill>
@@ -17349,31 +17277,30 @@
           <a:lstStyle/>
           <a:p>
             <a:r>
-              <a:rPr lang="en-US" sz="700" dirty="0" err="1" smtClean="0"/>
+              <a:rPr lang="en-US" sz="700" dirty="0" err="1"/>
               <a:t>TechInfoKit</a:t>
             </a:r>
             <a:r>
-              <a:rPr lang="en-US" sz="700" dirty="0" smtClean="0"/>
+              <a:rPr lang="en-US" sz="700" dirty="0"/>
               <a:t>/Edit, </a:t>
             </a:r>
             <a:r>
-              <a:rPr lang="en-US" sz="700" dirty="0" err="1" smtClean="0"/>
+              <a:rPr lang="en-US" sz="700" dirty="0" err="1"/>
               <a:t>TechId</a:t>
             </a:r>
             <a:r>
-              <a:rPr lang="en-US" sz="700" dirty="0" smtClean="0"/>
+              <a:rPr lang="en-US" sz="700" dirty="0"/>
               <a:t>?</a:t>
             </a:r>
           </a:p>
           <a:p>
-            <a:endParaRPr lang="en-US" sz="700" dirty="0" smtClean="0"/>
-          </a:p>
-          <a:p>
-            <a:r>
-              <a:rPr lang="en-US" sz="700" dirty="0" smtClean="0"/>
+            <a:endParaRPr lang="en-US" sz="700" dirty="0"/>
+          </a:p>
+          <a:p>
+            <a:r>
+              <a:rPr lang="en-US" sz="700" dirty="0"/>
               <a:t>MAIN MANU – ASSETS (Kit inventory)</a:t>
             </a:r>
-            <a:endParaRPr lang="en-US" sz="700" dirty="0"/>
           </a:p>
         </p:txBody>
       </p:sp>
@@ -17425,7 +17352,7 @@
           <a:p>
             <a:pPr algn="ctr"/>
             <a:r>
-              <a:rPr lang="en-US" sz="800" dirty="0" smtClean="0">
+              <a:rPr lang="en-US" sz="800" dirty="0">
                 <a:solidFill>
                   <a:schemeClr val="tx1"/>
                 </a:solidFill>
@@ -17483,7 +17410,7 @@
           <a:p>
             <a:pPr algn="ctr"/>
             <a:r>
-              <a:rPr lang="en-US" sz="800" dirty="0" smtClean="0">
+              <a:rPr lang="en-US" sz="800" dirty="0">
                 <a:solidFill>
                   <a:schemeClr val="tx1"/>
                 </a:solidFill>
@@ -17536,7 +17463,7 @@
           <a:p>
             <a:pPr algn="ctr"/>
             <a:r>
-              <a:rPr lang="en-US" sz="800" dirty="0" smtClean="0">
+              <a:rPr lang="en-US" sz="800" dirty="0">
                 <a:solidFill>
                   <a:schemeClr val="tx1"/>
                 </a:solidFill>
@@ -17629,7 +17556,7 @@
           <a:p>
             <a:pPr algn="ctr"/>
             <a:r>
-              <a:rPr lang="en-US" sz="800" dirty="0" smtClean="0">
+              <a:rPr lang="en-US" sz="800" dirty="0">
                 <a:solidFill>
                   <a:schemeClr val="tx1"/>
                 </a:solidFill>
@@ -17687,7 +17614,7 @@
           <a:p>
             <a:pPr algn="ctr"/>
             <a:r>
-              <a:rPr lang="en-US" sz="800" dirty="0" smtClean="0">
+              <a:rPr lang="en-US" sz="800" dirty="0">
                 <a:solidFill>
                   <a:schemeClr val="tx1"/>
                 </a:solidFill>
@@ -17745,7 +17672,7 @@
           <a:p>
             <a:pPr algn="ctr"/>
             <a:r>
-              <a:rPr lang="en-US" sz="800" dirty="0" smtClean="0">
+              <a:rPr lang="en-US" sz="800" dirty="0">
                 <a:solidFill>
                   <a:schemeClr val="tx1"/>
                 </a:solidFill>
@@ -17921,10 +17848,9 @@
           <a:lstStyle/>
           <a:p>
             <a:r>
-              <a:rPr lang="en-US" sz="800" dirty="0" smtClean="0"/>
+              <a:rPr lang="en-US" sz="800" dirty="0"/>
               <a:t>N</a:t>
             </a:r>
-            <a:endParaRPr lang="en-US" sz="800" dirty="0"/>
           </a:p>
         </p:txBody>
       </p:sp>
@@ -17951,10 +17877,9 @@
           <a:lstStyle/>
           <a:p>
             <a:r>
-              <a:rPr lang="en-US" sz="800" dirty="0" smtClean="0"/>
+              <a:rPr lang="en-US" sz="800" dirty="0"/>
               <a:t>Job/PO?</a:t>
             </a:r>
-            <a:endParaRPr lang="en-US" sz="800" dirty="0"/>
           </a:p>
         </p:txBody>
       </p:sp>
@@ -18001,7 +17926,7 @@
           <a:p>
             <a:pPr algn="ctr"/>
             <a:r>
-              <a:rPr lang="en-US" sz="800" dirty="0" smtClean="0">
+              <a:rPr lang="en-US" sz="800" dirty="0">
                 <a:solidFill>
                   <a:schemeClr val="tx1"/>
                 </a:solidFill>
@@ -18090,7 +18015,7 @@
           <a:p>
             <a:pPr algn="ctr"/>
             <a:r>
-              <a:rPr lang="en-US" sz="800" dirty="0" smtClean="0">
+              <a:rPr lang="en-US" sz="800" dirty="0">
                 <a:solidFill>
                   <a:schemeClr val="tx1"/>
                 </a:solidFill>
@@ -18179,7 +18104,7 @@
           <a:p>
             <a:pPr algn="ctr"/>
             <a:r>
-              <a:rPr lang="en-US" sz="800" dirty="0" smtClean="0">
+              <a:rPr lang="en-US" sz="800" dirty="0">
                 <a:solidFill>
                   <a:schemeClr val="tx1"/>
                 </a:solidFill>
@@ -18232,7 +18157,7 @@
           <a:p>
             <a:pPr algn="ctr"/>
             <a:r>
-              <a:rPr lang="en-US" sz="800" dirty="0" smtClean="0">
+              <a:rPr lang="en-US" sz="800" dirty="0">
                 <a:solidFill>
                   <a:schemeClr val="tx1"/>
                 </a:solidFill>
@@ -18428,7 +18353,7 @@
           <a:p>
             <a:pPr algn="ctr"/>
             <a:r>
-              <a:rPr lang="en-US" sz="800" dirty="0" smtClean="0">
+              <a:rPr lang="en-US" sz="800" dirty="0">
                 <a:solidFill>
                   <a:schemeClr val="tx1"/>
                 </a:solidFill>
@@ -18436,14 +18361,14 @@
               <a:t>JOB BOARD LIST</a:t>
             </a:r>
             <a:br>
-              <a:rPr lang="en-US" sz="800" dirty="0" smtClean="0">
+              <a:rPr lang="en-US" sz="800" dirty="0">
                 <a:solidFill>
                   <a:schemeClr val="tx1"/>
                 </a:solidFill>
               </a:rPr>
             </a:br>
             <a:r>
-              <a:rPr lang="en-US" sz="800" dirty="0" smtClean="0">
+              <a:rPr lang="en-US" sz="800" dirty="0">
                 <a:solidFill>
                   <a:schemeClr val="tx1"/>
                 </a:solidFill>
@@ -18512,10 +18437,9 @@
           <a:lstStyle/>
           <a:p>
             <a:r>
-              <a:rPr lang="en-US" sz="800" dirty="0" smtClean="0"/>
+              <a:rPr lang="en-US" sz="800" dirty="0"/>
               <a:t>YES</a:t>
             </a:r>
-            <a:endParaRPr lang="en-US" sz="800" dirty="0"/>
           </a:p>
         </p:txBody>
       </p:sp>
@@ -18542,10 +18466,9 @@
           <a:lstStyle/>
           <a:p>
             <a:r>
-              <a:rPr lang="en-US" sz="800" dirty="0" smtClean="0"/>
+              <a:rPr lang="en-US" sz="800" dirty="0"/>
               <a:t>NO</a:t>
             </a:r>
-            <a:endParaRPr lang="en-US" sz="800" dirty="0"/>
           </a:p>
         </p:txBody>
       </p:sp>
@@ -18592,7 +18515,7 @@
           <a:p>
             <a:pPr algn="ctr"/>
             <a:r>
-              <a:rPr lang="en-US" sz="800" dirty="0" smtClean="0">
+              <a:rPr lang="en-US" sz="800" dirty="0">
                 <a:solidFill>
                   <a:schemeClr val="tx1"/>
                 </a:solidFill>
@@ -18664,10 +18587,9 @@
           <a:lstStyle/>
           <a:p>
             <a:r>
-              <a:rPr lang="en-US" sz="800" dirty="0" smtClean="0"/>
+              <a:rPr lang="en-US" sz="800" dirty="0"/>
               <a:t>YES</a:t>
             </a:r>
-            <a:endParaRPr lang="en-US" sz="800" dirty="0"/>
           </a:p>
         </p:txBody>
       </p:sp>
@@ -18719,7 +18641,7 @@
           <a:p>
             <a:pPr algn="ctr"/>
             <a:r>
-              <a:rPr lang="en-US" sz="800" dirty="0" smtClean="0">
+              <a:rPr lang="en-US" sz="800" dirty="0">
                 <a:solidFill>
                   <a:schemeClr val="tx1"/>
                 </a:solidFill>
@@ -18772,7 +18694,7 @@
           <a:p>
             <a:pPr algn="ctr"/>
             <a:r>
-              <a:rPr lang="en-US" sz="800" dirty="0" smtClean="0">
+              <a:rPr lang="en-US" sz="800" dirty="0">
                 <a:solidFill>
                   <a:schemeClr val="tx1"/>
                 </a:solidFill>
@@ -18841,10 +18763,9 @@
           <a:lstStyle/>
           <a:p>
             <a:r>
-              <a:rPr lang="en-US" sz="800" dirty="0" smtClean="0"/>
+              <a:rPr lang="en-US" sz="800" dirty="0"/>
               <a:t>NO</a:t>
             </a:r>
-            <a:endParaRPr lang="en-US" sz="800" dirty="0"/>
           </a:p>
         </p:txBody>
       </p:sp>
@@ -18927,7 +18848,7 @@
           <a:p>
             <a:pPr algn="ctr"/>
             <a:r>
-              <a:rPr lang="en-US" sz="800" dirty="0" smtClean="0">
+              <a:rPr lang="en-US" sz="800" dirty="0">
                 <a:solidFill>
                   <a:schemeClr val="tx1"/>
                 </a:solidFill>
@@ -19016,7 +18937,7 @@
           <a:p>
             <a:pPr algn="ctr"/>
             <a:r>
-              <a:rPr lang="en-US" sz="800" dirty="0" smtClean="0">
+              <a:rPr lang="en-US" sz="800" dirty="0">
                 <a:solidFill>
                   <a:schemeClr val="tx1"/>
                 </a:solidFill>
@@ -19027,7 +18948,7 @@
           <a:p>
             <a:pPr algn="ctr"/>
             <a:r>
-              <a:rPr lang="en-US" sz="800" dirty="0" smtClean="0">
+              <a:rPr lang="en-US" sz="800" dirty="0">
                 <a:solidFill>
                   <a:schemeClr val="tx1"/>
                 </a:solidFill>
@@ -19085,7 +19006,7 @@
           <a:p>
             <a:pPr algn="ctr"/>
             <a:r>
-              <a:rPr lang="en-US" sz="800" dirty="0" smtClean="0">
+              <a:rPr lang="en-US" sz="800" dirty="0">
                 <a:solidFill>
                   <a:schemeClr val="tx1"/>
                 </a:solidFill>
@@ -19096,7 +19017,7 @@
           <a:p>
             <a:pPr algn="ctr"/>
             <a:r>
-              <a:rPr lang="en-US" sz="800" dirty="0" smtClean="0">
+              <a:rPr lang="en-US" sz="800" dirty="0">
                 <a:solidFill>
                   <a:schemeClr val="tx1"/>
                 </a:solidFill>
@@ -19185,7 +19106,7 @@
           <a:p>
             <a:pPr algn="ctr"/>
             <a:r>
-              <a:rPr lang="en-US" sz="800" dirty="0" smtClean="0">
+              <a:rPr lang="en-US" sz="800" dirty="0">
                 <a:solidFill>
                   <a:schemeClr val="tx1"/>
                 </a:solidFill>
@@ -19279,7 +19200,7 @@
           <a:p>
             <a:pPr algn="ctr"/>
             <a:r>
-              <a:rPr lang="en-US" sz="800" dirty="0" smtClean="0">
+              <a:rPr lang="en-US" sz="800" dirty="0">
                 <a:solidFill>
                   <a:schemeClr val="tx1"/>
                 </a:solidFill>
@@ -19348,18 +19269,13 @@
           <a:lstStyle/>
           <a:p>
             <a:r>
-              <a:rPr lang="en-US" sz="800" dirty="0" smtClean="0">
+              <a:rPr lang="en-US" sz="800" dirty="0">
                 <a:solidFill>
                   <a:srgbClr val="FF0000"/>
                 </a:solidFill>
               </a:rPr>
               <a:t>Template and info?</a:t>
             </a:r>
-            <a:endParaRPr lang="en-US" sz="800" dirty="0">
-              <a:solidFill>
-                <a:srgbClr val="FF0000"/>
-              </a:solidFill>
-            </a:endParaRPr>
           </a:p>
         </p:txBody>
       </p:sp>
@@ -19450,7 +19366,7 @@
           <a:p>
             <a:pPr algn="ctr"/>
             <a:r>
-              <a:rPr lang="en-US" sz="800" dirty="0" smtClean="0">
+              <a:rPr lang="en-US" sz="800" dirty="0">
                 <a:solidFill>
                   <a:schemeClr val="tx1"/>
                 </a:solidFill>
@@ -19483,10 +19399,9 @@
           <a:lstStyle/>
           <a:p>
             <a:r>
-              <a:rPr lang="en-US" sz="800" dirty="0" smtClean="0"/>
+              <a:rPr lang="en-US" sz="800" dirty="0"/>
               <a:t>Y</a:t>
             </a:r>
-            <a:endParaRPr lang="en-US" sz="800" dirty="0"/>
           </a:p>
         </p:txBody>
       </p:sp>
@@ -19569,7 +19484,7 @@
           <a:p>
             <a:pPr algn="ctr"/>
             <a:r>
-              <a:rPr lang="en-US" sz="800" dirty="0" smtClean="0">
+              <a:rPr lang="en-US" sz="800" dirty="0">
                 <a:solidFill>
                   <a:schemeClr val="tx1"/>
                 </a:solidFill>
@@ -19622,7 +19537,7 @@
           <a:p>
             <a:pPr algn="ctr"/>
             <a:r>
-              <a:rPr lang="en-US" sz="800" dirty="0" smtClean="0">
+              <a:rPr lang="en-US" sz="800" dirty="0">
                 <a:solidFill>
                   <a:schemeClr val="tx1"/>
                 </a:solidFill>
@@ -19782,7 +19697,7 @@
           <a:p>
             <a:pPr algn="ctr"/>
             <a:r>
-              <a:rPr lang="en-US" sz="800" dirty="0" smtClean="0">
+              <a:rPr lang="en-US" sz="800" dirty="0">
                 <a:solidFill>
                   <a:schemeClr val="tx1"/>
                 </a:solidFill>
@@ -19942,7 +19857,7 @@
           <a:p>
             <a:pPr algn="ctr"/>
             <a:r>
-              <a:rPr lang="en-US" sz="800" dirty="0" smtClean="0">
+              <a:rPr lang="en-US" sz="800" dirty="0">
                 <a:solidFill>
                   <a:schemeClr val="tx1"/>
                 </a:solidFill>
@@ -19995,7 +19910,7 @@
           <a:p>
             <a:pPr algn="ctr"/>
             <a:r>
-              <a:rPr lang="en-US" sz="800" dirty="0" smtClean="0">
+              <a:rPr lang="en-US" sz="800" dirty="0">
                 <a:solidFill>
                   <a:schemeClr val="tx1"/>
                 </a:solidFill>
@@ -20048,7 +19963,7 @@
           <a:p>
             <a:pPr algn="ctr"/>
             <a:r>
-              <a:rPr lang="en-US" sz="800" dirty="0" smtClean="0">
+              <a:rPr lang="en-US" sz="800" dirty="0">
                 <a:solidFill>
                   <a:schemeClr val="tx1"/>
                 </a:solidFill>
@@ -20280,18 +20195,13 @@
           <a:p>
             <a:pPr algn="ctr"/>
             <a:r>
-              <a:rPr lang="en-US" sz="800" dirty="0" smtClean="0">
+              <a:rPr lang="en-US" sz="800" dirty="0">
                 <a:solidFill>
                   <a:schemeClr val="tx1"/>
                 </a:solidFill>
               </a:rPr>
               <a:t>TOOLS</a:t>
             </a:r>
-            <a:endParaRPr lang="en-US" sz="800" dirty="0" smtClean="0">
-              <a:solidFill>
-                <a:schemeClr val="tx1"/>
-              </a:solidFill>
-            </a:endParaRPr>
           </a:p>
         </p:txBody>
       </p:sp>
@@ -20374,7 +20284,7 @@
           <a:p>
             <a:pPr algn="ctr"/>
             <a:r>
-              <a:rPr lang="en-US" sz="800" dirty="0" smtClean="0">
+              <a:rPr lang="en-US" sz="800" dirty="0">
                 <a:solidFill>
                   <a:schemeClr val="tx1"/>
                 </a:solidFill>
@@ -20427,7 +20337,7 @@
           <a:p>
             <a:pPr algn="ctr"/>
             <a:r>
-              <a:rPr lang="en-US" sz="800" dirty="0" smtClean="0">
+              <a:rPr lang="en-US" sz="800" dirty="0">
                 <a:solidFill>
                   <a:schemeClr val="tx1"/>
                 </a:solidFill>
@@ -20480,7 +20390,7 @@
           <a:p>
             <a:pPr algn="ctr"/>
             <a:r>
-              <a:rPr lang="en-US" sz="800" dirty="0" smtClean="0">
+              <a:rPr lang="en-US" sz="800" dirty="0">
                 <a:solidFill>
                   <a:schemeClr val="tx1"/>
                 </a:solidFill>
@@ -20712,7 +20622,7 @@
           <a:p>
             <a:pPr algn="ctr"/>
             <a:r>
-              <a:rPr lang="en-US" sz="800" dirty="0" smtClean="0">
+              <a:rPr lang="en-US" sz="800" dirty="0">
                 <a:solidFill>
                   <a:schemeClr val="tx1"/>
                 </a:solidFill>
@@ -20801,7 +20711,7 @@
           <a:p>
             <a:pPr algn="ctr"/>
             <a:r>
-              <a:rPr lang="en-US" sz="800" dirty="0" smtClean="0">
+              <a:rPr lang="en-US" sz="800" dirty="0">
                 <a:solidFill>
                   <a:schemeClr val="tx1"/>
                 </a:solidFill>
@@ -20854,7 +20764,7 @@
           <a:p>
             <a:pPr algn="ctr"/>
             <a:r>
-              <a:rPr lang="en-US" sz="800" dirty="0" smtClean="0">
+              <a:rPr lang="en-US" sz="800" dirty="0">
                 <a:solidFill>
                   <a:schemeClr val="tx1"/>
                 </a:solidFill>
@@ -20907,7 +20817,7 @@
           <a:p>
             <a:pPr algn="ctr"/>
             <a:r>
-              <a:rPr lang="en-US" sz="800" dirty="0" smtClean="0">
+              <a:rPr lang="en-US" sz="800" dirty="0">
                 <a:solidFill>
                   <a:schemeClr val="tx1"/>
                 </a:solidFill>
@@ -21318,18 +21228,13 @@
           <a:p>
             <a:pPr algn="ctr"/>
             <a:r>
-              <a:rPr lang="en-US" sz="1000" dirty="0" smtClean="0">
+              <a:rPr lang="en-US" sz="1000" dirty="0">
                 <a:solidFill>
                   <a:schemeClr val="tx1"/>
                 </a:solidFill>
               </a:rPr>
               <a:t>1</a:t>
             </a:r>
-            <a:endParaRPr lang="en-US" sz="1000" dirty="0">
-              <a:solidFill>
-                <a:schemeClr val="tx1"/>
-              </a:solidFill>
-            </a:endParaRPr>
           </a:p>
         </p:txBody>
       </p:sp>
@@ -21376,18 +21281,13 @@
           <a:p>
             <a:pPr algn="ctr"/>
             <a:r>
-              <a:rPr lang="en-US" sz="1000" dirty="0" smtClean="0">
+              <a:rPr lang="en-US" sz="1000" dirty="0">
                 <a:solidFill>
                   <a:schemeClr val="tx1"/>
                 </a:solidFill>
               </a:rPr>
               <a:t>1</a:t>
             </a:r>
-            <a:endParaRPr lang="en-US" sz="1000" dirty="0">
-              <a:solidFill>
-                <a:schemeClr val="tx1"/>
-              </a:solidFill>
-            </a:endParaRPr>
           </a:p>
         </p:txBody>
       </p:sp>
@@ -21473,7 +21373,7 @@
           <a:p>
             <a:pPr algn="ctr"/>
             <a:r>
-              <a:rPr lang="en-US" sz="800" dirty="0" smtClean="0">
+              <a:rPr lang="en-US" sz="800" dirty="0">
                 <a:solidFill>
                   <a:schemeClr val="tx1"/>
                 </a:solidFill>
@@ -21705,18 +21605,13 @@
           <a:p>
             <a:pPr algn="ctr"/>
             <a:r>
-              <a:rPr lang="en-US" sz="1000" dirty="0" smtClean="0">
+              <a:rPr lang="en-US" sz="1000" dirty="0">
                 <a:solidFill>
                   <a:schemeClr val="tx1"/>
                 </a:solidFill>
               </a:rPr>
               <a:t>2</a:t>
             </a:r>
-            <a:endParaRPr lang="en-US" sz="1000" dirty="0">
-              <a:solidFill>
-                <a:schemeClr val="tx1"/>
-              </a:solidFill>
-            </a:endParaRPr>
           </a:p>
         </p:txBody>
       </p:sp>
@@ -21801,18 +21696,13 @@
           <a:p>
             <a:pPr algn="ctr"/>
             <a:r>
-              <a:rPr lang="en-US" sz="1000" dirty="0" smtClean="0">
+              <a:rPr lang="en-US" sz="1000" dirty="0">
                 <a:solidFill>
                   <a:schemeClr val="tx1"/>
                 </a:solidFill>
               </a:rPr>
               <a:t>2</a:t>
             </a:r>
-            <a:endParaRPr lang="en-US" sz="1000" dirty="0">
-              <a:solidFill>
-                <a:schemeClr val="tx1"/>
-              </a:solidFill>
-            </a:endParaRPr>
           </a:p>
         </p:txBody>
       </p:sp>
@@ -22041,18 +21931,13 @@
           <a:p>
             <a:pPr algn="ctr"/>
             <a:r>
-              <a:rPr lang="en-US" sz="1000" dirty="0" smtClean="0">
+              <a:rPr lang="en-US" sz="1000" dirty="0">
                 <a:solidFill>
                   <a:schemeClr val="tx1"/>
                 </a:solidFill>
               </a:rPr>
               <a:t>3</a:t>
             </a:r>
-            <a:endParaRPr lang="en-US" sz="1000" dirty="0">
-              <a:solidFill>
-                <a:schemeClr val="tx1"/>
-              </a:solidFill>
-            </a:endParaRPr>
           </a:p>
         </p:txBody>
       </p:sp>
@@ -22140,18 +22025,13 @@
           <a:p>
             <a:pPr algn="ctr"/>
             <a:r>
-              <a:rPr lang="en-US" sz="1000" dirty="0" smtClean="0">
+              <a:rPr lang="en-US" sz="1000" dirty="0">
                 <a:solidFill>
                   <a:schemeClr val="tx1"/>
                 </a:solidFill>
               </a:rPr>
               <a:t>3</a:t>
             </a:r>
-            <a:endParaRPr lang="en-US" sz="1000" dirty="0">
-              <a:solidFill>
-                <a:schemeClr val="tx1"/>
-              </a:solidFill>
-            </a:endParaRPr>
           </a:p>
         </p:txBody>
       </p:sp>
@@ -22234,18 +22114,13 @@
           <a:p>
             <a:pPr algn="ctr"/>
             <a:r>
-              <a:rPr lang="en-US" sz="1000" dirty="0" smtClean="0">
+              <a:rPr lang="en-US" sz="1000" dirty="0">
                 <a:solidFill>
                   <a:schemeClr val="tx1"/>
                 </a:solidFill>
               </a:rPr>
               <a:t>4</a:t>
             </a:r>
-            <a:endParaRPr lang="en-US" sz="1000" dirty="0">
-              <a:solidFill>
-                <a:schemeClr val="tx1"/>
-              </a:solidFill>
-            </a:endParaRPr>
           </a:p>
         </p:txBody>
       </p:sp>
@@ -22330,7 +22205,7 @@
           <a:p>
             <a:pPr algn="ctr"/>
             <a:r>
-              <a:rPr lang="en-US" sz="1000" dirty="0" smtClean="0">
+              <a:rPr lang="en-US" sz="1000" dirty="0">
                 <a:solidFill>
                   <a:schemeClr val="tx1"/>
                 </a:solidFill>
@@ -22345,13 +22220,6 @@
   <p:clrMapOvr>
     <a:masterClrMapping/>
   </p:clrMapOvr>
-  <p:timing>
-    <p:tnLst>
-      <p:par>
-        <p:cTn id="1" dur="indefinite" restart="never" nodeType="tmRoot"/>
-      </p:par>
-    </p:tnLst>
-  </p:timing>
 </p:sld>
 </file>
 
@@ -22415,18 +22283,13 @@
           <a:p>
             <a:pPr algn="ctr"/>
             <a:r>
-              <a:rPr lang="en-US" sz="1000" dirty="0" smtClean="0">
+              <a:rPr lang="en-US" sz="1000" dirty="0">
                 <a:solidFill>
                   <a:schemeClr val="tx1"/>
                 </a:solidFill>
               </a:rPr>
               <a:t>4</a:t>
             </a:r>
-            <a:endParaRPr lang="en-US" sz="1000" dirty="0">
-              <a:solidFill>
-                <a:schemeClr val="tx1"/>
-              </a:solidFill>
-            </a:endParaRPr>
           </a:p>
         </p:txBody>
       </p:sp>
@@ -22545,7 +22408,7 @@
           <a:p>
             <a:pPr algn="ctr"/>
             <a:r>
-              <a:rPr lang="en-US" sz="800" dirty="0" smtClean="0">
+              <a:rPr lang="en-US" sz="800" dirty="0">
                 <a:solidFill>
                   <a:schemeClr val="tx1"/>
                 </a:solidFill>
@@ -22598,7 +22461,7 @@
           <a:p>
             <a:pPr algn="ctr"/>
             <a:r>
-              <a:rPr lang="en-US" sz="800" dirty="0" smtClean="0">
+              <a:rPr lang="en-US" sz="800" dirty="0">
                 <a:solidFill>
                   <a:schemeClr val="tx1"/>
                 </a:solidFill>
@@ -22651,7 +22514,7 @@
           <a:p>
             <a:pPr algn="ctr"/>
             <a:r>
-              <a:rPr lang="en-US" sz="1000" dirty="0" smtClean="0">
+              <a:rPr lang="en-US" sz="1000" dirty="0">
                 <a:solidFill>
                   <a:schemeClr val="tx1"/>
                 </a:solidFill>
@@ -22729,7 +22592,7 @@
           <a:p>
             <a:pPr algn="ctr"/>
             <a:r>
-              <a:rPr lang="en-US" sz="800" dirty="0" smtClean="0">
+              <a:rPr lang="en-US" sz="800" dirty="0">
                 <a:solidFill>
                   <a:schemeClr val="tx1"/>
                 </a:solidFill>
@@ -22818,7 +22681,7 @@
           <a:p>
             <a:pPr algn="ctr"/>
             <a:r>
-              <a:rPr lang="en-US" sz="800" dirty="0" smtClean="0">
+              <a:rPr lang="en-US" sz="800" dirty="0">
                 <a:solidFill>
                   <a:schemeClr val="tx1"/>
                 </a:solidFill>
@@ -22942,7 +22805,7 @@
           <a:p>
             <a:pPr algn="ctr"/>
             <a:r>
-              <a:rPr lang="en-US" sz="800" dirty="0" smtClean="0">
+              <a:rPr lang="en-US" sz="800" dirty="0">
                 <a:solidFill>
                   <a:schemeClr val="tx1"/>
                 </a:solidFill>
@@ -23174,7 +23037,7 @@
           <a:p>
             <a:pPr algn="ctr"/>
             <a:r>
-              <a:rPr lang="en-US" sz="800" dirty="0" smtClean="0">
+              <a:rPr lang="en-US" sz="800" dirty="0">
                 <a:solidFill>
                   <a:schemeClr val="tx1"/>
                 </a:solidFill>
@@ -23227,7 +23090,7 @@
           <a:p>
             <a:pPr algn="ctr"/>
             <a:r>
-              <a:rPr lang="en-US" sz="800" dirty="0" smtClean="0">
+              <a:rPr lang="en-US" sz="800" dirty="0">
                 <a:solidFill>
                   <a:schemeClr val="tx1"/>
                 </a:solidFill>
@@ -23352,7 +23215,7 @@
           <a:p>
             <a:pPr algn="ctr"/>
             <a:r>
-              <a:rPr lang="en-US" sz="800" dirty="0" smtClean="0">
+              <a:rPr lang="en-US" sz="800" dirty="0">
                 <a:solidFill>
                   <a:schemeClr val="tx1"/>
                 </a:solidFill>
@@ -23405,7 +23268,7 @@
           <a:p>
             <a:pPr algn="ctr"/>
             <a:r>
-              <a:rPr lang="en-US" sz="800" dirty="0" smtClean="0">
+              <a:rPr lang="en-US" sz="800" dirty="0">
                 <a:solidFill>
                   <a:schemeClr val="tx1"/>
                 </a:solidFill>
@@ -23458,7 +23321,7 @@
           <a:p>
             <a:pPr algn="ctr"/>
             <a:r>
-              <a:rPr lang="en-US" sz="800" dirty="0" smtClean="0">
+              <a:rPr lang="en-US" sz="800" dirty="0">
                 <a:solidFill>
                   <a:schemeClr val="tx1"/>
                 </a:solidFill>
@@ -23509,13 +23372,6 @@
   <p:clrMapOvr>
     <a:masterClrMapping/>
   </p:clrMapOvr>
-  <p:timing>
-    <p:tnLst>
-      <p:par>
-        <p:cTn id="1" dur="indefinite" restart="never" nodeType="tmRoot"/>
-      </p:par>
-    </p:tnLst>
-  </p:timing>
 </p:sld>
 </file>
 

</xml_diff>